<commit_message>
Update nach 2 Meilenstein
</commit_message>
<xml_diff>
--- a/2. Meilenstein.pptx
+++ b/2. Meilenstein.pptx
@@ -5,27 +5,32 @@
     <p:sldMasterId id="2147483660" r:id="rId1"/>
   </p:sldMasterIdLst>
   <p:notesMasterIdLst>
-    <p:notesMasterId r:id="rId17"/>
+    <p:notesMasterId r:id="rId22"/>
   </p:notesMasterIdLst>
   <p:handoutMasterIdLst>
-    <p:handoutMasterId r:id="rId18"/>
+    <p:handoutMasterId r:id="rId23"/>
   </p:handoutMasterIdLst>
   <p:sldIdLst>
     <p:sldId id="256" r:id="rId2"/>
     <p:sldId id="271" r:id="rId3"/>
     <p:sldId id="274" r:id="rId4"/>
-    <p:sldId id="276" r:id="rId5"/>
-    <p:sldId id="280" r:id="rId6"/>
+    <p:sldId id="293" r:id="rId5"/>
+    <p:sldId id="276" r:id="rId6"/>
     <p:sldId id="279" r:id="rId7"/>
-    <p:sldId id="281" r:id="rId8"/>
-    <p:sldId id="282" r:id="rId9"/>
-    <p:sldId id="283" r:id="rId10"/>
-    <p:sldId id="286" r:id="rId11"/>
-    <p:sldId id="287" r:id="rId12"/>
-    <p:sldId id="291" r:id="rId13"/>
-    <p:sldId id="288" r:id="rId14"/>
-    <p:sldId id="289" r:id="rId15"/>
-    <p:sldId id="290" r:id="rId16"/>
+    <p:sldId id="282" r:id="rId8"/>
+    <p:sldId id="281" r:id="rId9"/>
+    <p:sldId id="294" r:id="rId10"/>
+    <p:sldId id="283" r:id="rId11"/>
+    <p:sldId id="280" r:id="rId12"/>
+    <p:sldId id="292" r:id="rId13"/>
+    <p:sldId id="297" r:id="rId14"/>
+    <p:sldId id="296" r:id="rId15"/>
+    <p:sldId id="286" r:id="rId16"/>
+    <p:sldId id="287" r:id="rId17"/>
+    <p:sldId id="291" r:id="rId18"/>
+    <p:sldId id="288" r:id="rId19"/>
+    <p:sldId id="289" r:id="rId20"/>
+    <p:sldId id="290" r:id="rId21"/>
   </p:sldIdLst>
   <p:sldSz cx="9144000" cy="6858000" type="screen4x3"/>
   <p:notesSz cx="7102475" cy="10234613"/>
@@ -217,7 +222,7 @@
           <a:p>
             <a:fld id="{05E02316-A3A9-40CE-8399-988D8D269502}" type="datetimeFigureOut">
               <a:rPr lang="de-AT" smtClean="0"/>
-              <a:t>07.05.19</a:t>
+              <a:t>08.05.2019</a:t>
             </a:fld>
             <a:endParaRPr lang="de-AT"/>
           </a:p>
@@ -382,7 +387,7 @@
           <a:p>
             <a:fld id="{F5E89DEF-C035-41A2-9AFE-A6026D4C04BE}" type="datetimeFigureOut">
               <a:rPr lang="de-AT" smtClean="0"/>
-              <a:t>07.05.19</a:t>
+              <a:t>08.05.2019</a:t>
             </a:fld>
             <a:endParaRPr lang="de-AT"/>
           </a:p>
@@ -696,7 +701,7 @@
           <a:p>
             <a:r>
               <a:rPr lang="de-AT" dirty="0"/>
-              <a:t>Sehr geehrter Herr Koch, liebe Barbara, lieber David, ich möchte Sie rechtherzlich zu unserem 1. Meilensteintermin begrüßen</a:t>
+              <a:t>Sehr geehrter Herr Koch, liebe Barbara, lieber David, ich möchte Sie rechtherzlich zu unserem 2. Meilensteintermin begrüßen</a:t>
             </a:r>
           </a:p>
         </p:txBody>
@@ -728,6 +733,722 @@
     <p:extLst>
       <p:ext uri="{BB962C8B-B14F-4D97-AF65-F5344CB8AC3E}">
         <p14:creationId xmlns:p14="http://schemas.microsoft.com/office/powerpoint/2010/main" val="1865464645"/>
+      </p:ext>
+    </p:extLst>
+  </p:cSld>
+  <p:clrMapOvr>
+    <a:masterClrMapping/>
+  </p:clrMapOvr>
+</p:notes>
+</file>
+
+<file path=ppt/notesSlides/notesSlide10.xml><?xml version="1.0" encoding="utf-8"?>
+<p:notes xmlns:a="http://schemas.openxmlformats.org/drawingml/2006/main" xmlns:r="http://schemas.openxmlformats.org/officeDocument/2006/relationships" xmlns:p="http://schemas.openxmlformats.org/presentationml/2006/main">
+  <p:cSld>
+    <p:spTree>
+      <p:nvGrpSpPr>
+        <p:cNvPr id="1" name=""/>
+        <p:cNvGrpSpPr/>
+        <p:nvPr/>
+      </p:nvGrpSpPr>
+      <p:grpSpPr>
+        <a:xfrm>
+          <a:off x="0" y="0"/>
+          <a:ext cx="0" cy="0"/>
+          <a:chOff x="0" y="0"/>
+          <a:chExt cx="0" cy="0"/>
+        </a:xfrm>
+      </p:grpSpPr>
+      <p:sp>
+        <p:nvSpPr>
+          <p:cNvPr id="2" name="Folienbildplatzhalter 1"/>
+          <p:cNvSpPr>
+            <a:spLocks noGrp="1" noRot="1" noChangeAspect="1"/>
+          </p:cNvSpPr>
+          <p:nvPr>
+            <p:ph type="sldImg"/>
+          </p:nvPr>
+        </p:nvSpPr>
+        <p:spPr/>
+      </p:sp>
+      <p:sp>
+        <p:nvSpPr>
+          <p:cNvPr id="3" name="Notizenplatzhalter 2"/>
+          <p:cNvSpPr>
+            <a:spLocks noGrp="1"/>
+          </p:cNvSpPr>
+          <p:nvPr>
+            <p:ph type="body" idx="1"/>
+          </p:nvPr>
+        </p:nvSpPr>
+        <p:spPr/>
+        <p:txBody>
+          <a:bodyPr/>
+          <a:lstStyle/>
+          <a:p>
+            <a:endParaRPr lang="de-DE" dirty="0"/>
+          </a:p>
+        </p:txBody>
+      </p:sp>
+      <p:sp>
+        <p:nvSpPr>
+          <p:cNvPr id="4" name="Foliennummernplatzhalter 3"/>
+          <p:cNvSpPr>
+            <a:spLocks noGrp="1"/>
+          </p:cNvSpPr>
+          <p:nvPr>
+            <p:ph type="sldNum" sz="quarter" idx="5"/>
+          </p:nvPr>
+        </p:nvSpPr>
+        <p:spPr/>
+        <p:txBody>
+          <a:bodyPr/>
+          <a:lstStyle/>
+          <a:p>
+            <a:fld id="{BEF2A079-E7F8-4A78-8EEA-DD00A8D5DE37}" type="slidenum">
+              <a:rPr lang="de-AT" smtClean="0"/>
+              <a:t>11</a:t>
+            </a:fld>
+            <a:endParaRPr lang="de-AT"/>
+          </a:p>
+        </p:txBody>
+      </p:sp>
+    </p:spTree>
+    <p:extLst>
+      <p:ext uri="{BB962C8B-B14F-4D97-AF65-F5344CB8AC3E}">
+        <p14:creationId xmlns:p14="http://schemas.microsoft.com/office/powerpoint/2010/main" val="517328584"/>
+      </p:ext>
+    </p:extLst>
+  </p:cSld>
+  <p:clrMapOvr>
+    <a:masterClrMapping/>
+  </p:clrMapOvr>
+</p:notes>
+</file>
+
+<file path=ppt/notesSlides/notesSlide11.xml><?xml version="1.0" encoding="utf-8"?>
+<p:notes xmlns:a="http://schemas.openxmlformats.org/drawingml/2006/main" xmlns:r="http://schemas.openxmlformats.org/officeDocument/2006/relationships" xmlns:p="http://schemas.openxmlformats.org/presentationml/2006/main">
+  <p:cSld>
+    <p:spTree>
+      <p:nvGrpSpPr>
+        <p:cNvPr id="1" name=""/>
+        <p:cNvGrpSpPr/>
+        <p:nvPr/>
+      </p:nvGrpSpPr>
+      <p:grpSpPr>
+        <a:xfrm>
+          <a:off x="0" y="0"/>
+          <a:ext cx="0" cy="0"/>
+          <a:chOff x="0" y="0"/>
+          <a:chExt cx="0" cy="0"/>
+        </a:xfrm>
+      </p:grpSpPr>
+      <p:sp>
+        <p:nvSpPr>
+          <p:cNvPr id="2" name="Folienbildplatzhalter 1"/>
+          <p:cNvSpPr>
+            <a:spLocks noGrp="1" noRot="1" noChangeAspect="1"/>
+          </p:cNvSpPr>
+          <p:nvPr>
+            <p:ph type="sldImg"/>
+          </p:nvPr>
+        </p:nvSpPr>
+        <p:spPr/>
+      </p:sp>
+      <p:sp>
+        <p:nvSpPr>
+          <p:cNvPr id="3" name="Notizenplatzhalter 2"/>
+          <p:cNvSpPr>
+            <a:spLocks noGrp="1"/>
+          </p:cNvSpPr>
+          <p:nvPr>
+            <p:ph type="body" idx="1"/>
+          </p:nvPr>
+        </p:nvSpPr>
+        <p:spPr/>
+        <p:txBody>
+          <a:bodyPr/>
+          <a:lstStyle/>
+          <a:p>
+            <a:pPr lvl="0"/>
+            <a:endParaRPr lang="de-AT" sz="1200" u="none" strike="noStrike" kern="1200" dirty="0">
+              <a:solidFill>
+                <a:schemeClr val="tx1"/>
+              </a:solidFill>
+              <a:effectLst/>
+              <a:latin typeface="+mn-lt"/>
+              <a:ea typeface="+mn-ea"/>
+              <a:cs typeface="+mn-cs"/>
+            </a:endParaRPr>
+          </a:p>
+        </p:txBody>
+      </p:sp>
+      <p:sp>
+        <p:nvSpPr>
+          <p:cNvPr id="4" name="Foliennummernplatzhalter 3"/>
+          <p:cNvSpPr>
+            <a:spLocks noGrp="1"/>
+          </p:cNvSpPr>
+          <p:nvPr>
+            <p:ph type="sldNum" sz="quarter" idx="10"/>
+          </p:nvPr>
+        </p:nvSpPr>
+        <p:spPr/>
+        <p:txBody>
+          <a:bodyPr/>
+          <a:lstStyle/>
+          <a:p>
+            <a:fld id="{BEF2A079-E7F8-4A78-8EEA-DD00A8D5DE37}" type="slidenum">
+              <a:rPr lang="de-AT" smtClean="0"/>
+              <a:t>12</a:t>
+            </a:fld>
+            <a:endParaRPr lang="de-AT"/>
+          </a:p>
+        </p:txBody>
+      </p:sp>
+    </p:spTree>
+    <p:extLst>
+      <p:ext uri="{BB962C8B-B14F-4D97-AF65-F5344CB8AC3E}">
+        <p14:creationId xmlns:p14="http://schemas.microsoft.com/office/powerpoint/2010/main" val="2946701048"/>
+      </p:ext>
+    </p:extLst>
+  </p:cSld>
+  <p:clrMapOvr>
+    <a:masterClrMapping/>
+  </p:clrMapOvr>
+</p:notes>
+</file>
+
+<file path=ppt/notesSlides/notesSlide12.xml><?xml version="1.0" encoding="utf-8"?>
+<p:notes xmlns:a="http://schemas.openxmlformats.org/drawingml/2006/main" xmlns:r="http://schemas.openxmlformats.org/officeDocument/2006/relationships" xmlns:p="http://schemas.openxmlformats.org/presentationml/2006/main">
+  <p:cSld>
+    <p:spTree>
+      <p:nvGrpSpPr>
+        <p:cNvPr id="1" name=""/>
+        <p:cNvGrpSpPr/>
+        <p:nvPr/>
+      </p:nvGrpSpPr>
+      <p:grpSpPr>
+        <a:xfrm>
+          <a:off x="0" y="0"/>
+          <a:ext cx="0" cy="0"/>
+          <a:chOff x="0" y="0"/>
+          <a:chExt cx="0" cy="0"/>
+        </a:xfrm>
+      </p:grpSpPr>
+      <p:sp>
+        <p:nvSpPr>
+          <p:cNvPr id="2" name="Folienbildplatzhalter 1"/>
+          <p:cNvSpPr>
+            <a:spLocks noGrp="1" noRot="1" noChangeAspect="1"/>
+          </p:cNvSpPr>
+          <p:nvPr>
+            <p:ph type="sldImg"/>
+          </p:nvPr>
+        </p:nvSpPr>
+        <p:spPr/>
+      </p:sp>
+      <p:sp>
+        <p:nvSpPr>
+          <p:cNvPr id="3" name="Notizenplatzhalter 2"/>
+          <p:cNvSpPr>
+            <a:spLocks noGrp="1"/>
+          </p:cNvSpPr>
+          <p:nvPr>
+            <p:ph type="body" idx="1"/>
+          </p:nvPr>
+        </p:nvSpPr>
+        <p:spPr/>
+        <p:txBody>
+          <a:bodyPr/>
+          <a:lstStyle/>
+          <a:p>
+            <a:pPr lvl="0"/>
+            <a:endParaRPr lang="de-AT" sz="1200" u="none" strike="noStrike" kern="1200" dirty="0">
+              <a:solidFill>
+                <a:schemeClr val="tx1"/>
+              </a:solidFill>
+              <a:effectLst/>
+              <a:latin typeface="+mn-lt"/>
+              <a:ea typeface="+mn-ea"/>
+              <a:cs typeface="+mn-cs"/>
+            </a:endParaRPr>
+          </a:p>
+        </p:txBody>
+      </p:sp>
+      <p:sp>
+        <p:nvSpPr>
+          <p:cNvPr id="4" name="Foliennummernplatzhalter 3"/>
+          <p:cNvSpPr>
+            <a:spLocks noGrp="1"/>
+          </p:cNvSpPr>
+          <p:nvPr>
+            <p:ph type="sldNum" sz="quarter" idx="10"/>
+          </p:nvPr>
+        </p:nvSpPr>
+        <p:spPr/>
+        <p:txBody>
+          <a:bodyPr/>
+          <a:lstStyle/>
+          <a:p>
+            <a:fld id="{BEF2A079-E7F8-4A78-8EEA-DD00A8D5DE37}" type="slidenum">
+              <a:rPr lang="de-AT" smtClean="0"/>
+              <a:t>13</a:t>
+            </a:fld>
+            <a:endParaRPr lang="de-AT"/>
+          </a:p>
+        </p:txBody>
+      </p:sp>
+    </p:spTree>
+    <p:extLst>
+      <p:ext uri="{BB962C8B-B14F-4D97-AF65-F5344CB8AC3E}">
+        <p14:creationId xmlns:p14="http://schemas.microsoft.com/office/powerpoint/2010/main" val="3554100942"/>
+      </p:ext>
+    </p:extLst>
+  </p:cSld>
+  <p:clrMapOvr>
+    <a:masterClrMapping/>
+  </p:clrMapOvr>
+</p:notes>
+</file>
+
+<file path=ppt/notesSlides/notesSlide13.xml><?xml version="1.0" encoding="utf-8"?>
+<p:notes xmlns:a="http://schemas.openxmlformats.org/drawingml/2006/main" xmlns:r="http://schemas.openxmlformats.org/officeDocument/2006/relationships" xmlns:p="http://schemas.openxmlformats.org/presentationml/2006/main">
+  <p:cSld>
+    <p:spTree>
+      <p:nvGrpSpPr>
+        <p:cNvPr id="1" name=""/>
+        <p:cNvGrpSpPr/>
+        <p:nvPr/>
+      </p:nvGrpSpPr>
+      <p:grpSpPr>
+        <a:xfrm>
+          <a:off x="0" y="0"/>
+          <a:ext cx="0" cy="0"/>
+          <a:chOff x="0" y="0"/>
+          <a:chExt cx="0" cy="0"/>
+        </a:xfrm>
+      </p:grpSpPr>
+      <p:sp>
+        <p:nvSpPr>
+          <p:cNvPr id="2" name="Folienbildplatzhalter 1"/>
+          <p:cNvSpPr>
+            <a:spLocks noGrp="1" noRot="1" noChangeAspect="1"/>
+          </p:cNvSpPr>
+          <p:nvPr>
+            <p:ph type="sldImg"/>
+          </p:nvPr>
+        </p:nvSpPr>
+        <p:spPr/>
+      </p:sp>
+      <p:sp>
+        <p:nvSpPr>
+          <p:cNvPr id="3" name="Notizenplatzhalter 2"/>
+          <p:cNvSpPr>
+            <a:spLocks noGrp="1"/>
+          </p:cNvSpPr>
+          <p:nvPr>
+            <p:ph type="body" idx="1"/>
+          </p:nvPr>
+        </p:nvSpPr>
+        <p:spPr/>
+        <p:txBody>
+          <a:bodyPr/>
+          <a:lstStyle/>
+          <a:p>
+            <a:pPr lvl="0"/>
+            <a:r>
+              <a:rPr lang="de-DE" sz="1200" u="none" strike="noStrike" kern="1200" dirty="0">
+                <a:solidFill>
+                  <a:schemeClr val="tx1"/>
+                </a:solidFill>
+                <a:effectLst/>
+                <a:latin typeface="+mn-lt"/>
+                <a:ea typeface="+mn-ea"/>
+                <a:cs typeface="+mn-cs"/>
+              </a:rPr>
+              <a:t>Installation am Server: Herunterladen der benötigten Dateien und am Web Server anpassen; Installieren der CRM Lösung</a:t>
+            </a:r>
+            <a:endParaRPr lang="de-AT" sz="1200" u="none" strike="noStrike" kern="1200" dirty="0">
+              <a:solidFill>
+                <a:schemeClr val="tx1"/>
+              </a:solidFill>
+              <a:effectLst/>
+              <a:latin typeface="+mn-lt"/>
+              <a:ea typeface="+mn-ea"/>
+              <a:cs typeface="+mn-cs"/>
+            </a:endParaRPr>
+          </a:p>
+          <a:p>
+            <a:pPr lvl="0"/>
+            <a:r>
+              <a:rPr lang="de-DE" sz="1200" u="none" strike="noStrike" kern="1200" dirty="0">
+                <a:solidFill>
+                  <a:schemeClr val="tx1"/>
+                </a:solidFill>
+                <a:effectLst/>
+                <a:latin typeface="+mn-lt"/>
+                <a:ea typeface="+mn-ea"/>
+                <a:cs typeface="+mn-cs"/>
+              </a:rPr>
+              <a:t>Datenimport: Kontakte und weiter wichtige Daten importieren </a:t>
+            </a:r>
+            <a:endParaRPr lang="de-AT" sz="1200" u="none" strike="noStrike" kern="1200" dirty="0">
+              <a:solidFill>
+                <a:schemeClr val="tx1"/>
+              </a:solidFill>
+              <a:effectLst/>
+              <a:latin typeface="+mn-lt"/>
+              <a:ea typeface="+mn-ea"/>
+              <a:cs typeface="+mn-cs"/>
+            </a:endParaRPr>
+          </a:p>
+          <a:p>
+            <a:pPr lvl="0"/>
+            <a:r>
+              <a:rPr lang="de-DE" sz="1200" u="none" strike="noStrike" kern="1200" dirty="0">
+                <a:solidFill>
+                  <a:schemeClr val="tx1"/>
+                </a:solidFill>
+                <a:effectLst/>
+                <a:latin typeface="+mn-lt"/>
+                <a:ea typeface="+mn-ea"/>
+                <a:cs typeface="+mn-cs"/>
+              </a:rPr>
+              <a:t>Sich mit dem System auseinandersetzen/vertraut machen: Benutzerhandbuch (wenn vorhanden) durchlesen, Tutorials anschauen</a:t>
+            </a:r>
+            <a:endParaRPr lang="de-AT" sz="1200" u="none" strike="noStrike" kern="1200" dirty="0">
+              <a:solidFill>
+                <a:schemeClr val="tx1"/>
+              </a:solidFill>
+              <a:effectLst/>
+              <a:latin typeface="+mn-lt"/>
+              <a:ea typeface="+mn-ea"/>
+              <a:cs typeface="+mn-cs"/>
+            </a:endParaRPr>
+          </a:p>
+          <a:p>
+            <a:pPr lvl="0"/>
+            <a:r>
+              <a:rPr lang="de-DE" sz="1200" u="none" strike="noStrike" kern="1200" dirty="0">
+                <a:solidFill>
+                  <a:schemeClr val="tx1"/>
+                </a:solidFill>
+                <a:effectLst/>
+                <a:latin typeface="+mn-lt"/>
+                <a:ea typeface="+mn-ea"/>
+                <a:cs typeface="+mn-cs"/>
+              </a:rPr>
+              <a:t>Konfigurieren nach Anforderungen: System nach </a:t>
+            </a:r>
+            <a:r>
+              <a:rPr lang="de-DE" sz="1200" u="none" strike="noStrike" kern="1200" dirty="0" err="1">
+                <a:solidFill>
+                  <a:schemeClr val="tx1"/>
+                </a:solidFill>
+                <a:effectLst/>
+                <a:latin typeface="+mn-lt"/>
+                <a:ea typeface="+mn-ea"/>
+                <a:cs typeface="+mn-cs"/>
+              </a:rPr>
+              <a:t>need-to-have</a:t>
+            </a:r>
+            <a:r>
+              <a:rPr lang="de-DE" sz="1200" u="none" strike="noStrike" kern="1200" dirty="0">
+                <a:solidFill>
+                  <a:schemeClr val="tx1"/>
+                </a:solidFill>
+                <a:effectLst/>
+                <a:latin typeface="+mn-lt"/>
+                <a:ea typeface="+mn-ea"/>
+                <a:cs typeface="+mn-cs"/>
+              </a:rPr>
+              <a:t> Anforderungen anpassen und wenn möglich nice-</a:t>
+            </a:r>
+            <a:r>
+              <a:rPr lang="de-DE" sz="1200" u="none" strike="noStrike" kern="1200" dirty="0" err="1">
+                <a:solidFill>
+                  <a:schemeClr val="tx1"/>
+                </a:solidFill>
+                <a:effectLst/>
+                <a:latin typeface="+mn-lt"/>
+                <a:ea typeface="+mn-ea"/>
+                <a:cs typeface="+mn-cs"/>
+              </a:rPr>
+              <a:t>to</a:t>
+            </a:r>
+            <a:r>
+              <a:rPr lang="de-DE" sz="1200" u="none" strike="noStrike" kern="1200" dirty="0">
+                <a:solidFill>
+                  <a:schemeClr val="tx1"/>
+                </a:solidFill>
+                <a:effectLst/>
+                <a:latin typeface="+mn-lt"/>
+                <a:ea typeface="+mn-ea"/>
+                <a:cs typeface="+mn-cs"/>
+              </a:rPr>
+              <a:t>-</a:t>
+            </a:r>
+            <a:r>
+              <a:rPr lang="de-DE" sz="1200" u="none" strike="noStrike" kern="1200" dirty="0" err="1">
+                <a:solidFill>
+                  <a:schemeClr val="tx1"/>
+                </a:solidFill>
+                <a:effectLst/>
+                <a:latin typeface="+mn-lt"/>
+                <a:ea typeface="+mn-ea"/>
+                <a:cs typeface="+mn-cs"/>
+              </a:rPr>
+              <a:t>have</a:t>
+            </a:r>
+            <a:r>
+              <a:rPr lang="de-DE" sz="1200" u="none" strike="noStrike" kern="1200" dirty="0">
+                <a:solidFill>
+                  <a:schemeClr val="tx1"/>
+                </a:solidFill>
+                <a:effectLst/>
+                <a:latin typeface="+mn-lt"/>
+                <a:ea typeface="+mn-ea"/>
+                <a:cs typeface="+mn-cs"/>
+              </a:rPr>
+              <a:t> Features hinzufügen</a:t>
+            </a:r>
+            <a:endParaRPr lang="de-AT" sz="1200" u="none" strike="noStrike" kern="1200" dirty="0">
+              <a:solidFill>
+                <a:schemeClr val="tx1"/>
+              </a:solidFill>
+              <a:effectLst/>
+              <a:latin typeface="+mn-lt"/>
+              <a:ea typeface="+mn-ea"/>
+              <a:cs typeface="+mn-cs"/>
+            </a:endParaRPr>
+          </a:p>
+          <a:p>
+            <a:pPr lvl="0"/>
+            <a:r>
+              <a:rPr lang="de-DE" sz="1200" u="none" strike="noStrike" kern="1200" dirty="0">
+                <a:solidFill>
+                  <a:schemeClr val="tx1"/>
+                </a:solidFill>
+                <a:effectLst/>
+                <a:latin typeface="+mn-lt"/>
+                <a:ea typeface="+mn-ea"/>
+                <a:cs typeface="+mn-cs"/>
+              </a:rPr>
+              <a:t>Optimieren zwecks Usability: Design benutzerfreundlich gestalten, wichtige Funktionen leicht auffindbar machen</a:t>
+            </a:r>
+            <a:endParaRPr lang="de-AT" sz="1200" u="none" strike="noStrike" kern="1200" dirty="0">
+              <a:solidFill>
+                <a:schemeClr val="tx1"/>
+              </a:solidFill>
+              <a:effectLst/>
+              <a:latin typeface="+mn-lt"/>
+              <a:ea typeface="+mn-ea"/>
+              <a:cs typeface="+mn-cs"/>
+            </a:endParaRPr>
+          </a:p>
+          <a:p>
+            <a:pPr lvl="0"/>
+            <a:r>
+              <a:rPr lang="de-DE" sz="1200" u="none" strike="noStrike" kern="1200" dirty="0">
+                <a:solidFill>
+                  <a:schemeClr val="tx1"/>
+                </a:solidFill>
+                <a:effectLst/>
+                <a:latin typeface="+mn-lt"/>
+                <a:ea typeface="+mn-ea"/>
+                <a:cs typeface="+mn-cs"/>
+              </a:rPr>
+              <a:t>Testen: Überprüfen aller benötigten Funktionen</a:t>
+            </a:r>
+            <a:endParaRPr lang="de-AT" sz="1200" u="none" strike="noStrike" kern="1200" dirty="0">
+              <a:solidFill>
+                <a:schemeClr val="tx1"/>
+              </a:solidFill>
+              <a:effectLst/>
+              <a:latin typeface="+mn-lt"/>
+              <a:ea typeface="+mn-ea"/>
+              <a:cs typeface="+mn-cs"/>
+            </a:endParaRPr>
+          </a:p>
+          <a:p>
+            <a:pPr lvl="0"/>
+            <a:r>
+              <a:rPr lang="de-DE" sz="1200" u="none" strike="noStrike" kern="1200" dirty="0">
+                <a:solidFill>
+                  <a:schemeClr val="tx1"/>
+                </a:solidFill>
+                <a:effectLst/>
+                <a:latin typeface="+mn-lt"/>
+                <a:ea typeface="+mn-ea"/>
+                <a:cs typeface="+mn-cs"/>
+              </a:rPr>
+              <a:t>Einschulung mittels Workshop: Benutzerhandbuch schreiben, alle Funktionalitäten den Benutzern/Administratoren zeigen und vermitteln</a:t>
+            </a:r>
+            <a:endParaRPr lang="de-AT" sz="1200" u="none" strike="noStrike" kern="1200" dirty="0">
+              <a:solidFill>
+                <a:schemeClr val="tx1"/>
+              </a:solidFill>
+              <a:effectLst/>
+              <a:latin typeface="+mn-lt"/>
+              <a:ea typeface="+mn-ea"/>
+              <a:cs typeface="+mn-cs"/>
+            </a:endParaRPr>
+          </a:p>
+        </p:txBody>
+      </p:sp>
+      <p:sp>
+        <p:nvSpPr>
+          <p:cNvPr id="4" name="Foliennummernplatzhalter 3"/>
+          <p:cNvSpPr>
+            <a:spLocks noGrp="1"/>
+          </p:cNvSpPr>
+          <p:nvPr>
+            <p:ph type="sldNum" sz="quarter" idx="10"/>
+          </p:nvPr>
+        </p:nvSpPr>
+        <p:spPr/>
+        <p:txBody>
+          <a:bodyPr/>
+          <a:lstStyle/>
+          <a:p>
+            <a:fld id="{BEF2A079-E7F8-4A78-8EEA-DD00A8D5DE37}" type="slidenum">
+              <a:rPr lang="de-AT" smtClean="0"/>
+              <a:t>14</a:t>
+            </a:fld>
+            <a:endParaRPr lang="de-AT"/>
+          </a:p>
+        </p:txBody>
+      </p:sp>
+    </p:spTree>
+    <p:extLst>
+      <p:ext uri="{BB962C8B-B14F-4D97-AF65-F5344CB8AC3E}">
+        <p14:creationId xmlns:p14="http://schemas.microsoft.com/office/powerpoint/2010/main" val="2539021950"/>
+      </p:ext>
+    </p:extLst>
+  </p:cSld>
+  <p:clrMapOvr>
+    <a:masterClrMapping/>
+  </p:clrMapOvr>
+</p:notes>
+</file>
+
+<file path=ppt/notesSlides/notesSlide14.xml><?xml version="1.0" encoding="utf-8"?>
+<p:notes xmlns:a="http://schemas.openxmlformats.org/drawingml/2006/main" xmlns:r="http://schemas.openxmlformats.org/officeDocument/2006/relationships" xmlns:p="http://schemas.openxmlformats.org/presentationml/2006/main">
+  <p:cSld>
+    <p:spTree>
+      <p:nvGrpSpPr>
+        <p:cNvPr id="1" name=""/>
+        <p:cNvGrpSpPr/>
+        <p:nvPr/>
+      </p:nvGrpSpPr>
+      <p:grpSpPr>
+        <a:xfrm>
+          <a:off x="0" y="0"/>
+          <a:ext cx="0" cy="0"/>
+          <a:chOff x="0" y="0"/>
+          <a:chExt cx="0" cy="0"/>
+        </a:xfrm>
+      </p:grpSpPr>
+      <p:sp>
+        <p:nvSpPr>
+          <p:cNvPr id="2" name="Folienbildplatzhalter 1"/>
+          <p:cNvSpPr>
+            <a:spLocks noGrp="1" noRot="1" noChangeAspect="1"/>
+          </p:cNvSpPr>
+          <p:nvPr>
+            <p:ph type="sldImg"/>
+          </p:nvPr>
+        </p:nvSpPr>
+        <p:spPr/>
+      </p:sp>
+      <p:sp>
+        <p:nvSpPr>
+          <p:cNvPr id="3" name="Notizenplatzhalter 2"/>
+          <p:cNvSpPr>
+            <a:spLocks noGrp="1"/>
+          </p:cNvSpPr>
+          <p:nvPr>
+            <p:ph type="body" idx="1"/>
+          </p:nvPr>
+        </p:nvSpPr>
+        <p:spPr/>
+        <p:txBody>
+          <a:bodyPr/>
+          <a:lstStyle/>
+          <a:p>
+            <a:r>
+              <a:rPr lang="de-AT" dirty="0"/>
+              <a:t>Plan auf Tagesbasis dargestellt, da wir sich persönlich die </a:t>
+            </a:r>
+            <a:r>
+              <a:rPr lang="de-AT" dirty="0" err="1"/>
+              <a:t>uhrzeiten</a:t>
+            </a:r>
+            <a:r>
+              <a:rPr lang="de-AT" dirty="0"/>
+              <a:t> für </a:t>
+            </a:r>
+            <a:r>
+              <a:rPr lang="de-AT" dirty="0" err="1"/>
+              <a:t>meetings</a:t>
+            </a:r>
+            <a:r>
+              <a:rPr lang="de-AT" dirty="0"/>
+              <a:t> ausmachen und auch die </a:t>
+            </a:r>
+            <a:r>
+              <a:rPr lang="de-AT" dirty="0" err="1"/>
+              <a:t>zeiterfassung</a:t>
+            </a:r>
+            <a:r>
+              <a:rPr lang="de-AT" dirty="0"/>
+              <a:t> /</a:t>
+            </a:r>
+            <a:r>
+              <a:rPr lang="de-AT" dirty="0" err="1"/>
+              <a:t>dokumenation</a:t>
+            </a:r>
+            <a:r>
+              <a:rPr lang="de-AT" dirty="0"/>
+              <a:t> separat erfolgt</a:t>
+            </a:r>
+          </a:p>
+          <a:p>
+            <a:r>
+              <a:rPr lang="de-AT" dirty="0"/>
+              <a:t>Balkendiagramm welches graphisch zeitliche Abfolge darstellt</a:t>
+            </a:r>
+          </a:p>
+        </p:txBody>
+      </p:sp>
+      <p:sp>
+        <p:nvSpPr>
+          <p:cNvPr id="4" name="Foliennummernplatzhalter 3"/>
+          <p:cNvSpPr>
+            <a:spLocks noGrp="1"/>
+          </p:cNvSpPr>
+          <p:nvPr>
+            <p:ph type="sldNum" sz="quarter" idx="10"/>
+          </p:nvPr>
+        </p:nvSpPr>
+        <p:spPr/>
+        <p:txBody>
+          <a:bodyPr/>
+          <a:lstStyle/>
+          <a:p>
+            <a:fld id="{BEF2A079-E7F8-4A78-8EEA-DD00A8D5DE37}" type="slidenum">
+              <a:rPr lang="de-AT" smtClean="0"/>
+              <a:t>15</a:t>
+            </a:fld>
+            <a:endParaRPr lang="de-AT"/>
+          </a:p>
+        </p:txBody>
+      </p:sp>
+    </p:spTree>
+    <p:extLst>
+      <p:ext uri="{BB962C8B-B14F-4D97-AF65-F5344CB8AC3E}">
+        <p14:creationId xmlns:p14="http://schemas.microsoft.com/office/powerpoint/2010/main" val="2240075764"/>
       </p:ext>
     </p:extLst>
   </p:cSld>
@@ -1573,7 +2294,7 @@
     </p:spTree>
     <p:extLst>
       <p:ext uri="{BB962C8B-B14F-4D97-AF65-F5344CB8AC3E}">
-        <p14:creationId xmlns:p14="http://schemas.microsoft.com/office/powerpoint/2010/main" val="2075391512"/>
+        <p14:creationId xmlns:p14="http://schemas.microsoft.com/office/powerpoint/2010/main" val="661544566"/>
       </p:ext>
     </p:extLst>
   </p:cSld>
@@ -1627,7 +2348,374 @@
           <a:bodyPr/>
           <a:lstStyle/>
           <a:p>
-            <a:endParaRPr lang="de-DE" dirty="0"/>
+            <a:r>
+              <a:rPr lang="de-AT" dirty="0"/>
+              <a:t>Nach unserer Interviewphase (Barbara, David, Michael, Angela) </a:t>
+            </a:r>
+            <a:r>
+              <a:rPr lang="de-AT" dirty="0">
+                <a:sym typeface="Wingdings" pitchFamily="2" charset="2"/>
+              </a:rPr>
+              <a:t> Anforderungskatalog erstellt</a:t>
+            </a:r>
+          </a:p>
+          <a:p>
+            <a:endParaRPr lang="de-AT" dirty="0">
+              <a:sym typeface="Wingdings" pitchFamily="2" charset="2"/>
+            </a:endParaRPr>
+          </a:p>
+          <a:p>
+            <a:pPr marL="0" marR="0" lvl="0" indent="0" algn="l" defTabSz="914400" rtl="0" eaLnBrk="1" fontAlgn="auto" latinLnBrk="0" hangingPunct="1">
+              <a:lnSpc>
+                <a:spcPct val="100000"/>
+              </a:lnSpc>
+              <a:spcBef>
+                <a:spcPts val="0"/>
+              </a:spcBef>
+              <a:spcAft>
+                <a:spcPts val="0"/>
+              </a:spcAft>
+              <a:buClrTx/>
+              <a:buSzTx/>
+              <a:buFontTx/>
+              <a:buNone/>
+              <a:tabLst/>
+              <a:defRPr/>
+            </a:pPr>
+            <a:r>
+              <a:rPr lang="de-AT" dirty="0">
+                <a:sym typeface="Wingdings" pitchFamily="2" charset="2"/>
+              </a:rPr>
+              <a:t>Unterteilung in:</a:t>
+            </a:r>
+          </a:p>
+          <a:p>
+            <a:pPr marL="0" marR="0" lvl="0" indent="0" algn="l" defTabSz="914400" rtl="0" eaLnBrk="1" fontAlgn="auto" latinLnBrk="0" hangingPunct="1">
+              <a:lnSpc>
+                <a:spcPct val="100000"/>
+              </a:lnSpc>
+              <a:spcBef>
+                <a:spcPts val="0"/>
+              </a:spcBef>
+              <a:spcAft>
+                <a:spcPts val="0"/>
+              </a:spcAft>
+              <a:buClrTx/>
+              <a:buSzTx/>
+              <a:buFontTx/>
+              <a:buNone/>
+              <a:tabLst/>
+              <a:defRPr/>
+            </a:pPr>
+            <a:r>
+              <a:rPr lang="de-AT" dirty="0">
+                <a:sym typeface="Wingdings" pitchFamily="2" charset="2"/>
+              </a:rPr>
+              <a:t>Allgemeine Funktionalitäten  </a:t>
+            </a:r>
+            <a:r>
+              <a:rPr lang="de-AT" sz="1200" kern="1200" dirty="0">
+                <a:solidFill>
+                  <a:schemeClr val="tx1"/>
+                </a:solidFill>
+                <a:effectLst/>
+                <a:latin typeface="+mn-lt"/>
+                <a:ea typeface="+mn-ea"/>
+                <a:cs typeface="+mn-cs"/>
+              </a:rPr>
+              <a:t>Funktionalität des Programms besteht darin Informationen über Kunden zu sammeln, Kontakte zu organisieren, Einladungen herauszuschicken und Daten in gewünschter Form zu darstellen.  </a:t>
+            </a:r>
+          </a:p>
+          <a:p>
+            <a:endParaRPr lang="de-AT" dirty="0"/>
+          </a:p>
+          <a:p>
+            <a:endParaRPr lang="de-AT" dirty="0"/>
+          </a:p>
+          <a:p>
+            <a:r>
+              <a:rPr lang="de-AT" dirty="0"/>
+              <a:t>Designeinschränkungen:</a:t>
+            </a:r>
+          </a:p>
+          <a:p>
+            <a:pPr marL="0" marR="0" lvl="0" indent="0" algn="l" defTabSz="914400" rtl="0" eaLnBrk="1" fontAlgn="auto" latinLnBrk="0" hangingPunct="1">
+              <a:lnSpc>
+                <a:spcPct val="100000"/>
+              </a:lnSpc>
+              <a:spcBef>
+                <a:spcPts val="0"/>
+              </a:spcBef>
+              <a:spcAft>
+                <a:spcPts val="0"/>
+              </a:spcAft>
+              <a:buClrTx/>
+              <a:buSzTx/>
+              <a:buFontTx/>
+              <a:buNone/>
+              <a:tabLst/>
+              <a:defRPr/>
+            </a:pPr>
+            <a:r>
+              <a:rPr lang="de-AT" dirty="0" err="1"/>
+              <a:t>Bsp</a:t>
+            </a:r>
+            <a:r>
+              <a:rPr lang="de-AT" dirty="0"/>
+              <a:t>: Bei Interview herausgestellt --&gt; Windows, Linux, OSX </a:t>
+            </a:r>
+            <a:r>
+              <a:rPr lang="de-AT" dirty="0">
+                <a:sym typeface="Wingdings" pitchFamily="2" charset="2"/>
+              </a:rPr>
+              <a:t> Lauffähig oder </a:t>
+            </a:r>
+            <a:r>
+              <a:rPr lang="de-AT" sz="1200" kern="1200" dirty="0">
+                <a:solidFill>
+                  <a:schemeClr val="tx1"/>
+                </a:solidFill>
+                <a:effectLst/>
+                <a:latin typeface="+mn-lt"/>
+                <a:ea typeface="+mn-ea"/>
+                <a:cs typeface="+mn-cs"/>
+              </a:rPr>
+              <a:t>Das Programm muss ausbaubar sein</a:t>
+            </a:r>
+          </a:p>
+          <a:p>
+            <a:endParaRPr lang="de-AT" dirty="0"/>
+          </a:p>
+          <a:p>
+            <a:r>
+              <a:rPr lang="de-AT" dirty="0"/>
+              <a:t>Benutzereigenschaften </a:t>
+            </a:r>
+            <a:r>
+              <a:rPr lang="de-AT" dirty="0">
+                <a:sym typeface="Wingdings" pitchFamily="2" charset="2"/>
+              </a:rPr>
+              <a:t> Unterteilung in </a:t>
+            </a:r>
+            <a:r>
+              <a:rPr lang="de-AT" dirty="0" err="1">
+                <a:sym typeface="Wingdings" pitchFamily="2" charset="2"/>
+              </a:rPr>
+              <a:t>need</a:t>
+            </a:r>
+            <a:r>
+              <a:rPr lang="de-AT" dirty="0">
+                <a:sym typeface="Wingdings" pitchFamily="2" charset="2"/>
+              </a:rPr>
+              <a:t> </a:t>
+            </a:r>
+            <a:r>
+              <a:rPr lang="de-AT" dirty="0" err="1">
+                <a:sym typeface="Wingdings" pitchFamily="2" charset="2"/>
+              </a:rPr>
+              <a:t>to</a:t>
+            </a:r>
+            <a:r>
+              <a:rPr lang="de-AT" dirty="0">
+                <a:sym typeface="Wingdings" pitchFamily="2" charset="2"/>
+              </a:rPr>
+              <a:t> </a:t>
+            </a:r>
+            <a:r>
+              <a:rPr lang="de-AT" dirty="0" err="1">
+                <a:sym typeface="Wingdings" pitchFamily="2" charset="2"/>
+              </a:rPr>
+              <a:t>have</a:t>
+            </a:r>
+            <a:r>
+              <a:rPr lang="de-AT" dirty="0">
+                <a:sym typeface="Wingdings" pitchFamily="2" charset="2"/>
+              </a:rPr>
+              <a:t> und </a:t>
+            </a:r>
+            <a:r>
+              <a:rPr lang="de-AT" dirty="0" err="1">
+                <a:sym typeface="Wingdings" pitchFamily="2" charset="2"/>
+              </a:rPr>
+              <a:t>nice</a:t>
+            </a:r>
+            <a:r>
+              <a:rPr lang="de-AT" dirty="0">
+                <a:sym typeface="Wingdings" pitchFamily="2" charset="2"/>
+              </a:rPr>
+              <a:t> </a:t>
+            </a:r>
+            <a:r>
+              <a:rPr lang="de-AT" dirty="0" err="1">
+                <a:sym typeface="Wingdings" pitchFamily="2" charset="2"/>
+              </a:rPr>
+              <a:t>to</a:t>
+            </a:r>
+            <a:r>
+              <a:rPr lang="de-AT" dirty="0">
+                <a:sym typeface="Wingdings" pitchFamily="2" charset="2"/>
+              </a:rPr>
+              <a:t> </a:t>
+            </a:r>
+            <a:r>
+              <a:rPr lang="de-AT" dirty="0" err="1">
+                <a:sym typeface="Wingdings" pitchFamily="2" charset="2"/>
+              </a:rPr>
+              <a:t>have</a:t>
+            </a:r>
+            <a:endParaRPr lang="de-AT" dirty="0">
+              <a:sym typeface="Wingdings" pitchFamily="2" charset="2"/>
+            </a:endParaRPr>
+          </a:p>
+          <a:p>
+            <a:pPr marL="0" marR="0" lvl="0" indent="0" algn="l" defTabSz="914400" rtl="0" eaLnBrk="1" fontAlgn="auto" latinLnBrk="0" hangingPunct="1">
+              <a:lnSpc>
+                <a:spcPct val="100000"/>
+              </a:lnSpc>
+              <a:spcBef>
+                <a:spcPts val="0"/>
+              </a:spcBef>
+              <a:spcAft>
+                <a:spcPts val="0"/>
+              </a:spcAft>
+              <a:buClrTx/>
+              <a:buSzTx/>
+              <a:buFontTx/>
+              <a:buNone/>
+              <a:tabLst/>
+              <a:defRPr/>
+            </a:pPr>
+            <a:r>
+              <a:rPr lang="de-AT" dirty="0" err="1">
+                <a:sym typeface="Wingdings" pitchFamily="2" charset="2"/>
+              </a:rPr>
+              <a:t>Bsp</a:t>
+            </a:r>
+            <a:r>
+              <a:rPr lang="de-AT" dirty="0">
+                <a:sym typeface="Wingdings" pitchFamily="2" charset="2"/>
+              </a:rPr>
+              <a:t> </a:t>
+            </a:r>
+            <a:r>
+              <a:rPr lang="de-AT" dirty="0" err="1">
+                <a:sym typeface="Wingdings" pitchFamily="2" charset="2"/>
+              </a:rPr>
+              <a:t>need</a:t>
+            </a:r>
+            <a:r>
+              <a:rPr lang="de-AT" dirty="0">
+                <a:sym typeface="Wingdings" pitchFamily="2" charset="2"/>
+              </a:rPr>
+              <a:t> </a:t>
+            </a:r>
+            <a:r>
+              <a:rPr lang="de-AT" dirty="0" err="1">
+                <a:sym typeface="Wingdings" pitchFamily="2" charset="2"/>
+              </a:rPr>
+              <a:t>to</a:t>
+            </a:r>
+            <a:r>
+              <a:rPr lang="de-AT" dirty="0">
+                <a:sym typeface="Wingdings" pitchFamily="2" charset="2"/>
+              </a:rPr>
+              <a:t> </a:t>
+            </a:r>
+            <a:r>
+              <a:rPr lang="de-AT" dirty="0" err="1">
+                <a:sym typeface="Wingdings" pitchFamily="2" charset="2"/>
+              </a:rPr>
+              <a:t>have</a:t>
+            </a:r>
+            <a:r>
+              <a:rPr lang="de-AT" dirty="0">
+                <a:sym typeface="Wingdings" pitchFamily="2" charset="2"/>
+              </a:rPr>
+              <a:t>: </a:t>
+            </a:r>
+            <a:r>
+              <a:rPr lang="de-AT" sz="1200" kern="1200" dirty="0">
+                <a:solidFill>
+                  <a:schemeClr val="tx1"/>
+                </a:solidFill>
+                <a:effectLst/>
+                <a:latin typeface="+mn-lt"/>
+                <a:ea typeface="+mn-ea"/>
+                <a:cs typeface="+mn-cs"/>
+              </a:rPr>
+              <a:t>Das Programm soll in der Lage sein, Kontakte zu hinzufügen. Diesbezüglich werden folgende Informationen eingefügt: „Titel“, „Vorname“, „Nachname“, „Email“, „Nummer“, „Adresse“, „DSGVO“</a:t>
+            </a:r>
+          </a:p>
+          <a:p>
+            <a:endParaRPr lang="de-AT" dirty="0"/>
+          </a:p>
+          <a:p>
+            <a:r>
+              <a:rPr lang="de-AT" dirty="0" err="1"/>
+              <a:t>Bsp</a:t>
+            </a:r>
+            <a:r>
+              <a:rPr lang="de-AT" dirty="0"/>
+              <a:t> </a:t>
+            </a:r>
+            <a:r>
+              <a:rPr lang="de-AT" dirty="0" err="1"/>
+              <a:t>nice</a:t>
+            </a:r>
+            <a:r>
+              <a:rPr lang="de-AT" dirty="0"/>
+              <a:t> </a:t>
+            </a:r>
+            <a:r>
+              <a:rPr lang="de-AT" dirty="0" err="1"/>
+              <a:t>to</a:t>
+            </a:r>
+            <a:r>
+              <a:rPr lang="de-AT" dirty="0"/>
+              <a:t> </a:t>
+            </a:r>
+            <a:r>
+              <a:rPr lang="de-AT" dirty="0" err="1"/>
+              <a:t>have</a:t>
+            </a:r>
+            <a:r>
+              <a:rPr lang="de-AT" dirty="0"/>
+              <a:t>:</a:t>
+            </a:r>
+          </a:p>
+          <a:p>
+            <a:pPr marL="0" marR="0" lvl="0" indent="0" algn="l" defTabSz="914400" rtl="0" eaLnBrk="1" fontAlgn="auto" latinLnBrk="0" hangingPunct="1">
+              <a:lnSpc>
+                <a:spcPct val="100000"/>
+              </a:lnSpc>
+              <a:spcBef>
+                <a:spcPts val="0"/>
+              </a:spcBef>
+              <a:spcAft>
+                <a:spcPts val="0"/>
+              </a:spcAft>
+              <a:buClrTx/>
+              <a:buSzTx/>
+              <a:buFontTx/>
+              <a:buNone/>
+              <a:tabLst/>
+              <a:defRPr/>
+            </a:pPr>
+            <a:r>
+              <a:rPr lang="de-AT" sz="1200" kern="1200" dirty="0">
+                <a:solidFill>
+                  <a:schemeClr val="tx1"/>
+                </a:solidFill>
+                <a:effectLst/>
+                <a:latin typeface="+mn-lt"/>
+                <a:ea typeface="+mn-ea"/>
+                <a:cs typeface="+mn-cs"/>
+              </a:rPr>
+              <a:t>Das Programm soll in der Lage sein, doppelte Kontakte zu erkennen.</a:t>
+            </a:r>
+          </a:p>
+          <a:p>
+            <a:endParaRPr lang="de-AT" dirty="0"/>
           </a:p>
         </p:txBody>
       </p:sp>
@@ -1638,7 +2726,7 @@
             <a:spLocks noGrp="1"/>
           </p:cNvSpPr>
           <p:nvPr>
-            <p:ph type="sldNum" sz="quarter" idx="5"/>
+            <p:ph type="sldNum" sz="quarter" idx="10"/>
           </p:nvPr>
         </p:nvSpPr>
         <p:spPr/>
@@ -1657,7 +2745,7 @@
     </p:spTree>
     <p:extLst>
       <p:ext uri="{BB962C8B-B14F-4D97-AF65-F5344CB8AC3E}">
-        <p14:creationId xmlns:p14="http://schemas.microsoft.com/office/powerpoint/2010/main" val="517328584"/>
+        <p14:creationId xmlns:p14="http://schemas.microsoft.com/office/powerpoint/2010/main" val="2075391512"/>
       </p:ext>
     </p:extLst>
   </p:cSld>
@@ -1799,13 +2887,13 @@
               <a:rPr lang="de-AT" dirty="0">
                 <a:effectLst/>
               </a:rPr>
-              <a:t> </a:t>
+              <a:t> (</a:t>
             </a:r>
             <a:r>
               <a:rPr lang="de-DE" dirty="0">
                 <a:sym typeface="Wingdings" pitchFamily="2" charset="2"/>
               </a:rPr>
-              <a:t>weiterarbeiten oder eine neue entwickeln. </a:t>
+              <a:t>weiterarbeiten oder eine neue entwickeln.)</a:t>
             </a:r>
           </a:p>
           <a:p>
@@ -1819,28 +2907,6 @@
               <a:rPr lang="de-DE" sz="1200" dirty="0"/>
               <a:t>Aufwand, Flexibilität, Dauer der Implementierung/Erweiterung, Risiken und Auswirkungen miteinander verglichen und daraus versucht zu entscheiden, ob es besser wäre ein neues CRM System auf die Beine zu stellen oder das jetzige auszubauen..</a:t>
             </a:r>
-          </a:p>
-          <a:p>
-            <a:endParaRPr lang="de-DE" sz="1200" dirty="0">
-              <a:sym typeface="Wingdings" pitchFamily="2" charset="2"/>
-            </a:endParaRPr>
-          </a:p>
-          <a:p>
-            <a:endParaRPr lang="de-DE" dirty="0">
-              <a:sym typeface="Wingdings" pitchFamily="2" charset="2"/>
-            </a:endParaRPr>
-          </a:p>
-          <a:p>
-            <a:endParaRPr lang="de-DE" dirty="0">
-              <a:sym typeface="Wingdings" pitchFamily="2" charset="2"/>
-            </a:endParaRPr>
-          </a:p>
-          <a:p>
-            <a:endParaRPr lang="de-DE" dirty="0">
-              <a:sym typeface="Wingdings" pitchFamily="2" charset="2"/>
-            </a:endParaRPr>
-          </a:p>
-          <a:p>
             <a:endParaRPr lang="de-DE" dirty="0"/>
           </a:p>
         </p:txBody>
@@ -1871,7 +2937,7 @@
     </p:spTree>
     <p:extLst>
       <p:ext uri="{BB962C8B-B14F-4D97-AF65-F5344CB8AC3E}">
-        <p14:creationId xmlns:p14="http://schemas.microsoft.com/office/powerpoint/2010/main" val="1698394493"/>
+        <p14:creationId xmlns:p14="http://schemas.microsoft.com/office/powerpoint/2010/main" val="376725333"/>
       </p:ext>
     </p:extLst>
   </p:cSld>
@@ -1925,100 +2991,7 @@
           <a:bodyPr/>
           <a:lstStyle/>
           <a:p>
-            <a:pPr lvl="0"/>
-            <a:r>
-              <a:rPr lang="de-DE" sz="1200" u="none" strike="noStrike" kern="1200" dirty="0">
-                <a:solidFill>
-                  <a:schemeClr val="tx1"/>
-                </a:solidFill>
-                <a:effectLst/>
-                <a:latin typeface="+mn-lt"/>
-                <a:ea typeface="+mn-ea"/>
-                <a:cs typeface="+mn-cs"/>
-              </a:rPr>
-              <a:t>Sollte die derzeitige CRM Software weiterentwickelt werden, müssten nicht allzu gravierende Veränderungen durchgeführt werden. </a:t>
-            </a:r>
-            <a:endParaRPr lang="de-AT" sz="1200" u="none" strike="noStrike" kern="1200" dirty="0">
-              <a:solidFill>
-                <a:schemeClr val="tx1"/>
-              </a:solidFill>
-              <a:effectLst/>
-              <a:latin typeface="+mn-lt"/>
-              <a:ea typeface="+mn-ea"/>
-              <a:cs typeface="+mn-cs"/>
-            </a:endParaRPr>
-          </a:p>
-          <a:p>
-            <a:pPr lvl="0"/>
-            <a:r>
-              <a:rPr lang="de-DE" sz="1200" u="none" strike="noStrike" kern="1200" dirty="0">
-                <a:solidFill>
-                  <a:schemeClr val="tx1"/>
-                </a:solidFill>
-                <a:effectLst/>
-                <a:latin typeface="+mn-lt"/>
-                <a:ea typeface="+mn-ea"/>
-                <a:cs typeface="+mn-cs"/>
-              </a:rPr>
-              <a:t>Zudem erspart man sich viel Zeit für Installation und für die Anbindung an den Server sowie für die Einschulung ins neue System (Benutzer &amp; Studenten). </a:t>
-            </a:r>
-            <a:endParaRPr lang="de-AT" sz="1200" u="none" strike="noStrike" kern="1200" dirty="0">
-              <a:solidFill>
-                <a:schemeClr val="tx1"/>
-              </a:solidFill>
-              <a:effectLst/>
-              <a:latin typeface="+mn-lt"/>
-              <a:ea typeface="+mn-ea"/>
-              <a:cs typeface="+mn-cs"/>
-            </a:endParaRPr>
-          </a:p>
-          <a:p>
-            <a:pPr lvl="0"/>
-            <a:r>
-              <a:rPr lang="de-DE" sz="1200" u="none" strike="noStrike" kern="1200" dirty="0">
-                <a:solidFill>
-                  <a:schemeClr val="tx1"/>
-                </a:solidFill>
-                <a:effectLst/>
-                <a:latin typeface="+mn-lt"/>
-                <a:ea typeface="+mn-ea"/>
-                <a:cs typeface="+mn-cs"/>
-              </a:rPr>
-              <a:t>Das Positive am derzeitigen CRM Lösung ist, dass viele Anforderungen leicht im Internet durch paar Klicks abgeändert werden können. </a:t>
-            </a:r>
-            <a:endParaRPr lang="de-AT" sz="1200" u="none" strike="noStrike" kern="1200" dirty="0">
-              <a:solidFill>
-                <a:schemeClr val="tx1"/>
-              </a:solidFill>
-              <a:effectLst/>
-              <a:latin typeface="+mn-lt"/>
-              <a:ea typeface="+mn-ea"/>
-              <a:cs typeface="+mn-cs"/>
-            </a:endParaRPr>
-          </a:p>
-          <a:p>
-            <a:pPr lvl="0"/>
-            <a:r>
-              <a:rPr lang="de-DE" sz="1200" u="none" strike="noStrike" kern="1200" dirty="0">
-                <a:solidFill>
-                  <a:schemeClr val="tx1"/>
-                </a:solidFill>
-                <a:effectLst/>
-                <a:latin typeface="+mn-lt"/>
-                <a:ea typeface="+mn-ea"/>
-                <a:cs typeface="+mn-cs"/>
-              </a:rPr>
-              <a:t>Es besteht aber die Gefahr, dass es gewisse Umstellungen nicht möglich sind. </a:t>
-            </a:r>
-            <a:endParaRPr lang="de-AT" sz="1200" u="none" strike="noStrike" kern="1200" dirty="0">
-              <a:solidFill>
-                <a:schemeClr val="tx1"/>
-              </a:solidFill>
-              <a:effectLst/>
-              <a:latin typeface="+mn-lt"/>
-              <a:ea typeface="+mn-ea"/>
-              <a:cs typeface="+mn-cs"/>
-            </a:endParaRPr>
+            <a:endParaRPr lang="de-AT" dirty="0"/>
           </a:p>
         </p:txBody>
       </p:sp>
@@ -2048,7 +3021,7 @@
     </p:spTree>
     <p:extLst>
       <p:ext uri="{BB962C8B-B14F-4D97-AF65-F5344CB8AC3E}">
-        <p14:creationId xmlns:p14="http://schemas.microsoft.com/office/powerpoint/2010/main" val="3852155900"/>
+        <p14:creationId xmlns:p14="http://schemas.microsoft.com/office/powerpoint/2010/main" val="1316904196"/>
       </p:ext>
     </p:extLst>
   </p:cSld>
@@ -2102,7 +3075,100 @@
           <a:bodyPr/>
           <a:lstStyle/>
           <a:p>
-            <a:endParaRPr lang="de-AT" dirty="0"/>
+            <a:pPr lvl="0"/>
+            <a:r>
+              <a:rPr lang="de-DE" sz="1200" u="none" strike="noStrike" kern="1200" dirty="0">
+                <a:solidFill>
+                  <a:schemeClr val="tx1"/>
+                </a:solidFill>
+                <a:effectLst/>
+                <a:latin typeface="+mn-lt"/>
+                <a:ea typeface="+mn-ea"/>
+                <a:cs typeface="+mn-cs"/>
+              </a:rPr>
+              <a:t>Sollte die derzeitige CRM Software weiterentwickelt werden, müssten nicht allzu gravierende Veränderungen durchgeführt werden. </a:t>
+            </a:r>
+            <a:endParaRPr lang="de-AT" sz="1200" u="none" strike="noStrike" kern="1200" dirty="0">
+              <a:solidFill>
+                <a:schemeClr val="tx1"/>
+              </a:solidFill>
+              <a:effectLst/>
+              <a:latin typeface="+mn-lt"/>
+              <a:ea typeface="+mn-ea"/>
+              <a:cs typeface="+mn-cs"/>
+            </a:endParaRPr>
+          </a:p>
+          <a:p>
+            <a:pPr lvl="0"/>
+            <a:r>
+              <a:rPr lang="de-DE" sz="1200" u="none" strike="noStrike" kern="1200" dirty="0">
+                <a:solidFill>
+                  <a:schemeClr val="tx1"/>
+                </a:solidFill>
+                <a:effectLst/>
+                <a:latin typeface="+mn-lt"/>
+                <a:ea typeface="+mn-ea"/>
+                <a:cs typeface="+mn-cs"/>
+              </a:rPr>
+              <a:t>Zudem erspart man sich viel Zeit für Installation und für die Anbindung an den Server sowie für die Einschulung ins neue System (Benutzer &amp; Studenten). </a:t>
+            </a:r>
+            <a:endParaRPr lang="de-AT" sz="1200" u="none" strike="noStrike" kern="1200" dirty="0">
+              <a:solidFill>
+                <a:schemeClr val="tx1"/>
+              </a:solidFill>
+              <a:effectLst/>
+              <a:latin typeface="+mn-lt"/>
+              <a:ea typeface="+mn-ea"/>
+              <a:cs typeface="+mn-cs"/>
+            </a:endParaRPr>
+          </a:p>
+          <a:p>
+            <a:pPr lvl="0"/>
+            <a:r>
+              <a:rPr lang="de-DE" sz="1200" u="none" strike="noStrike" kern="1200" dirty="0">
+                <a:solidFill>
+                  <a:schemeClr val="tx1"/>
+                </a:solidFill>
+                <a:effectLst/>
+                <a:latin typeface="+mn-lt"/>
+                <a:ea typeface="+mn-ea"/>
+                <a:cs typeface="+mn-cs"/>
+              </a:rPr>
+              <a:t>Das Positive am derzeitigen CRM Lösung ist, dass viele Anforderungen leicht im Internet durch paar Klicks abgeändert werden können. </a:t>
+            </a:r>
+            <a:endParaRPr lang="de-AT" sz="1200" u="none" strike="noStrike" kern="1200" dirty="0">
+              <a:solidFill>
+                <a:schemeClr val="tx1"/>
+              </a:solidFill>
+              <a:effectLst/>
+              <a:latin typeface="+mn-lt"/>
+              <a:ea typeface="+mn-ea"/>
+              <a:cs typeface="+mn-cs"/>
+            </a:endParaRPr>
+          </a:p>
+          <a:p>
+            <a:pPr lvl="0"/>
+            <a:r>
+              <a:rPr lang="de-DE" sz="1200" u="none" strike="noStrike" kern="1200" dirty="0">
+                <a:solidFill>
+                  <a:schemeClr val="tx1"/>
+                </a:solidFill>
+                <a:effectLst/>
+                <a:latin typeface="+mn-lt"/>
+                <a:ea typeface="+mn-ea"/>
+                <a:cs typeface="+mn-cs"/>
+              </a:rPr>
+              <a:t>Es besteht aber die Gefahr, dass es gewisse Umstellungen nicht möglich sind. </a:t>
+            </a:r>
+            <a:endParaRPr lang="de-AT" sz="1200" u="none" strike="noStrike" kern="1200" dirty="0">
+              <a:solidFill>
+                <a:schemeClr val="tx1"/>
+              </a:solidFill>
+              <a:effectLst/>
+              <a:latin typeface="+mn-lt"/>
+              <a:ea typeface="+mn-ea"/>
+              <a:cs typeface="+mn-cs"/>
+            </a:endParaRPr>
           </a:p>
         </p:txBody>
       </p:sp>
@@ -2132,7 +3198,7 @@
     </p:spTree>
     <p:extLst>
       <p:ext uri="{BB962C8B-B14F-4D97-AF65-F5344CB8AC3E}">
-        <p14:creationId xmlns:p14="http://schemas.microsoft.com/office/powerpoint/2010/main" val="334700214"/>
+        <p14:creationId xmlns:p14="http://schemas.microsoft.com/office/powerpoint/2010/main" val="3223235949"/>
       </p:ext>
     </p:extLst>
   </p:cSld>
@@ -2186,9 +3252,6 @@
           <a:bodyPr/>
           <a:lstStyle/>
           <a:p>
-            <a:endParaRPr lang="de-AT" dirty="0"/>
-          </a:p>
-          <a:p>
             <a:r>
               <a:rPr lang="de-DE" sz="1200" b="1" kern="1200" dirty="0" err="1">
                 <a:solidFill>
@@ -2293,29 +3356,6 @@
                 <a:ea typeface="+mn-ea"/>
                 <a:cs typeface="+mn-cs"/>
               </a:rPr>
-              <a:t> </a:t>
-            </a:r>
-            <a:endParaRPr lang="de-AT" sz="1200" kern="1200" dirty="0">
-              <a:solidFill>
-                <a:schemeClr val="tx1"/>
-              </a:solidFill>
-              <a:effectLst/>
-              <a:latin typeface="+mn-lt"/>
-              <a:ea typeface="+mn-ea"/>
-              <a:cs typeface="+mn-cs"/>
-            </a:endParaRPr>
-          </a:p>
-          <a:p>
-            <a:r>
-              <a:rPr lang="de-DE" sz="1200" kern="1200" dirty="0">
-                <a:solidFill>
-                  <a:schemeClr val="tx1"/>
-                </a:solidFill>
-                <a:effectLst/>
-                <a:latin typeface="+mn-lt"/>
-                <a:ea typeface="+mn-ea"/>
-                <a:cs typeface="+mn-cs"/>
-              </a:rPr>
               <a:t>Im Vergleich zu </a:t>
             </a:r>
             <a:r>
@@ -2470,32 +3510,6 @@
               <a:cs typeface="+mn-cs"/>
             </a:endParaRPr>
           </a:p>
-          <a:p>
-            <a:r>
-              <a:rPr lang="de-DE" sz="1200" kern="1200" dirty="0">
-                <a:solidFill>
-                  <a:schemeClr val="tx1"/>
-                </a:solidFill>
-                <a:effectLst/>
-                <a:latin typeface="+mn-lt"/>
-                <a:ea typeface="+mn-ea"/>
-                <a:cs typeface="+mn-cs"/>
-              </a:rPr>
-              <a:t> </a:t>
-            </a:r>
-            <a:endParaRPr lang="de-AT" sz="1200" kern="1200" dirty="0">
-              <a:solidFill>
-                <a:schemeClr val="tx1"/>
-              </a:solidFill>
-              <a:effectLst/>
-              <a:latin typeface="+mn-lt"/>
-              <a:ea typeface="+mn-ea"/>
-              <a:cs typeface="+mn-cs"/>
-            </a:endParaRPr>
-          </a:p>
-          <a:p>
-            <a:endParaRPr lang="de-AT" dirty="0"/>
-          </a:p>
         </p:txBody>
       </p:sp>
       <p:sp>
@@ -2524,7 +3538,7 @@
     </p:spTree>
     <p:extLst>
       <p:ext uri="{BB962C8B-B14F-4D97-AF65-F5344CB8AC3E}">
-        <p14:creationId xmlns:p14="http://schemas.microsoft.com/office/powerpoint/2010/main" val="706370610"/>
+        <p14:creationId xmlns:p14="http://schemas.microsoft.com/office/powerpoint/2010/main" val="2694509793"/>
       </p:ext>
     </p:extLst>
   </p:cSld>
@@ -2579,47 +3593,288 @@
           <a:lstStyle/>
           <a:p>
             <a:r>
-              <a:rPr lang="de-AT" dirty="0"/>
-              <a:t>Plan auf Tagesbasis dargestellt, da wir sich persönlich die </a:t>
-            </a:r>
-            <a:r>
-              <a:rPr lang="de-AT" dirty="0" err="1"/>
-              <a:t>uhrzeiten</a:t>
-            </a:r>
-            <a:r>
-              <a:rPr lang="de-AT" dirty="0"/>
-              <a:t> für </a:t>
-            </a:r>
-            <a:r>
-              <a:rPr lang="de-AT" dirty="0" err="1"/>
-              <a:t>meetings</a:t>
-            </a:r>
-            <a:r>
-              <a:rPr lang="de-AT" dirty="0"/>
-              <a:t> ausmachen und auch die </a:t>
-            </a:r>
-            <a:r>
-              <a:rPr lang="de-AT" dirty="0" err="1"/>
-              <a:t>zeiterfassung</a:t>
-            </a:r>
-            <a:r>
-              <a:rPr lang="de-AT" dirty="0"/>
-              <a:t> /</a:t>
-            </a:r>
-            <a:r>
-              <a:rPr lang="de-AT" dirty="0" err="1"/>
-              <a:t>dokumenation</a:t>
-            </a:r>
-            <a:r>
-              <a:rPr lang="de-AT" dirty="0"/>
-              <a:t> separat erfolgt</a:t>
-            </a:r>
-          </a:p>
-          <a:p>
-            <a:r>
-              <a:rPr lang="de-AT" dirty="0"/>
-              <a:t>Balkendiagramm welches graphisch zeitliche Abfolge darstellt</a:t>
-            </a:r>
+              <a:rPr lang="de-DE" sz="1200" b="1" kern="1200" dirty="0" err="1">
+                <a:solidFill>
+                  <a:schemeClr val="tx1"/>
+                </a:solidFill>
+                <a:effectLst/>
+                <a:latin typeface="+mn-lt"/>
+                <a:ea typeface="+mn-ea"/>
+                <a:cs typeface="+mn-cs"/>
+              </a:rPr>
+              <a:t>CiviCRM</a:t>
+            </a:r>
+            <a:r>
+              <a:rPr lang="de-DE" sz="1200" b="1" kern="1200" dirty="0">
+                <a:solidFill>
+                  <a:schemeClr val="tx1"/>
+                </a:solidFill>
+                <a:effectLst/>
+                <a:latin typeface="+mn-lt"/>
+                <a:ea typeface="+mn-ea"/>
+                <a:cs typeface="+mn-cs"/>
+              </a:rPr>
+              <a:t> </a:t>
+            </a:r>
+            <a:r>
+              <a:rPr lang="de-DE" sz="1200" kern="1200" dirty="0">
+                <a:solidFill>
+                  <a:schemeClr val="tx1"/>
+                </a:solidFill>
+                <a:effectLst/>
+                <a:latin typeface="+mn-lt"/>
+                <a:ea typeface="+mn-ea"/>
+                <a:cs typeface="+mn-cs"/>
+              </a:rPr>
+              <a:t>bietet einen großen Umfang an Funktionen, die aber sehr versteckt sind. Bei manchen Funktionen gibt es zu viele Informationen, was sehr unübersichtlich wirkt. Man muss oft mehrere Seiten öffnen um beispielsweise zur Übersicht aller Events zu kommen. Zudem ist es in Sachen Design zurückgeblieben. Im Vergleich zu dem derzeitigen CRM System bietet </a:t>
+            </a:r>
+            <a:r>
+              <a:rPr lang="de-DE" sz="1200" kern="1200" dirty="0" err="1">
+                <a:solidFill>
+                  <a:schemeClr val="tx1"/>
+                </a:solidFill>
+                <a:effectLst/>
+                <a:latin typeface="+mn-lt"/>
+                <a:ea typeface="+mn-ea"/>
+                <a:cs typeface="+mn-cs"/>
+              </a:rPr>
+              <a:t>CiviCRM</a:t>
+            </a:r>
+            <a:r>
+              <a:rPr lang="de-DE" sz="1200" kern="1200" dirty="0">
+                <a:solidFill>
+                  <a:schemeClr val="tx1"/>
+                </a:solidFill>
+                <a:effectLst/>
+                <a:latin typeface="+mn-lt"/>
+                <a:ea typeface="+mn-ea"/>
+                <a:cs typeface="+mn-cs"/>
+              </a:rPr>
+              <a:t> viel mehr Möglichkeiten Informationen zu speichern, die aber nicht notwendig sind bzw. eher störend als nützlich sind. </a:t>
+            </a:r>
+            <a:endParaRPr lang="de-AT" sz="1200" kern="1200" dirty="0">
+              <a:solidFill>
+                <a:schemeClr val="tx1"/>
+              </a:solidFill>
+              <a:effectLst/>
+              <a:latin typeface="+mn-lt"/>
+              <a:ea typeface="+mn-ea"/>
+              <a:cs typeface="+mn-cs"/>
+            </a:endParaRPr>
+          </a:p>
+          <a:p>
+            <a:r>
+              <a:rPr lang="de-DE" sz="1200" kern="1200" dirty="0">
+                <a:solidFill>
+                  <a:schemeClr val="tx1"/>
+                </a:solidFill>
+                <a:effectLst/>
+                <a:latin typeface="+mn-lt"/>
+                <a:ea typeface="+mn-ea"/>
+                <a:cs typeface="+mn-cs"/>
+              </a:rPr>
+              <a:t> </a:t>
+            </a:r>
+            <a:endParaRPr lang="de-AT" sz="1200" kern="1200" dirty="0">
+              <a:solidFill>
+                <a:schemeClr val="tx1"/>
+              </a:solidFill>
+              <a:effectLst/>
+              <a:latin typeface="+mn-lt"/>
+              <a:ea typeface="+mn-ea"/>
+              <a:cs typeface="+mn-cs"/>
+            </a:endParaRPr>
+          </a:p>
+          <a:p>
+            <a:r>
+              <a:rPr lang="de-DE" sz="1200" kern="1200" dirty="0">
+                <a:solidFill>
+                  <a:schemeClr val="tx1"/>
+                </a:solidFill>
+                <a:effectLst/>
+                <a:latin typeface="+mn-lt"/>
+                <a:ea typeface="+mn-ea"/>
+                <a:cs typeface="+mn-cs"/>
+              </a:rPr>
+              <a:t>Im Vergleich zu </a:t>
+            </a:r>
+            <a:r>
+              <a:rPr lang="de-DE" sz="1200" kern="1200" dirty="0" err="1">
+                <a:solidFill>
+                  <a:schemeClr val="tx1"/>
+                </a:solidFill>
+                <a:effectLst/>
+                <a:latin typeface="+mn-lt"/>
+                <a:ea typeface="+mn-ea"/>
+                <a:cs typeface="+mn-cs"/>
+              </a:rPr>
+              <a:t>Odoo</a:t>
+            </a:r>
+            <a:r>
+              <a:rPr lang="de-DE" sz="1200" kern="1200" dirty="0">
+                <a:solidFill>
+                  <a:schemeClr val="tx1"/>
+                </a:solidFill>
+                <a:effectLst/>
+                <a:latin typeface="+mn-lt"/>
+                <a:ea typeface="+mn-ea"/>
+                <a:cs typeface="+mn-cs"/>
+              </a:rPr>
+              <a:t> CRM hat </a:t>
+            </a:r>
+            <a:r>
+              <a:rPr lang="de-DE" sz="1200" kern="1200" dirty="0" err="1">
+                <a:solidFill>
+                  <a:schemeClr val="tx1"/>
+                </a:solidFill>
+                <a:effectLst/>
+                <a:latin typeface="+mn-lt"/>
+                <a:ea typeface="+mn-ea"/>
+                <a:cs typeface="+mn-cs"/>
+              </a:rPr>
+              <a:t>CiviCRM</a:t>
+            </a:r>
+            <a:r>
+              <a:rPr lang="de-DE" sz="1200" kern="1200" dirty="0">
+                <a:solidFill>
+                  <a:schemeClr val="tx1"/>
+                </a:solidFill>
+                <a:effectLst/>
+                <a:latin typeface="+mn-lt"/>
+                <a:ea typeface="+mn-ea"/>
+                <a:cs typeface="+mn-cs"/>
+              </a:rPr>
+              <a:t> keine mobile Anwendung und kann derzeit nur auf drei Content-Management-System installiert werden. Auch im Bereich Design und Usability ist </a:t>
+            </a:r>
+            <a:r>
+              <a:rPr lang="de-DE" sz="1200" kern="1200" dirty="0" err="1">
+                <a:solidFill>
+                  <a:schemeClr val="tx1"/>
+                </a:solidFill>
+                <a:effectLst/>
+                <a:latin typeface="+mn-lt"/>
+                <a:ea typeface="+mn-ea"/>
+                <a:cs typeface="+mn-cs"/>
+              </a:rPr>
+              <a:t>Odoo</a:t>
+            </a:r>
+            <a:r>
+              <a:rPr lang="de-DE" sz="1200" kern="1200" dirty="0">
+                <a:solidFill>
+                  <a:schemeClr val="tx1"/>
+                </a:solidFill>
+                <a:effectLst/>
+                <a:latin typeface="+mn-lt"/>
+                <a:ea typeface="+mn-ea"/>
+                <a:cs typeface="+mn-cs"/>
+              </a:rPr>
+              <a:t> im Vorsprung. </a:t>
+            </a:r>
+            <a:endParaRPr lang="de-AT" sz="1200" kern="1200" dirty="0">
+              <a:solidFill>
+                <a:schemeClr val="tx1"/>
+              </a:solidFill>
+              <a:effectLst/>
+              <a:latin typeface="+mn-lt"/>
+              <a:ea typeface="+mn-ea"/>
+              <a:cs typeface="+mn-cs"/>
+            </a:endParaRPr>
+          </a:p>
+          <a:p>
+            <a:r>
+              <a:rPr lang="de-DE" sz="1200" kern="1200" dirty="0">
+                <a:solidFill>
+                  <a:schemeClr val="tx1"/>
+                </a:solidFill>
+                <a:effectLst/>
+                <a:latin typeface="+mn-lt"/>
+                <a:ea typeface="+mn-ea"/>
+                <a:cs typeface="+mn-cs"/>
+              </a:rPr>
+              <a:t> </a:t>
+            </a:r>
+            <a:endParaRPr lang="de-AT" sz="1200" kern="1200" dirty="0">
+              <a:solidFill>
+                <a:schemeClr val="tx1"/>
+              </a:solidFill>
+              <a:effectLst/>
+              <a:latin typeface="+mn-lt"/>
+              <a:ea typeface="+mn-ea"/>
+              <a:cs typeface="+mn-cs"/>
+            </a:endParaRPr>
+          </a:p>
+          <a:p>
+            <a:r>
+              <a:rPr lang="de-DE" sz="1200" kern="1200" dirty="0">
+                <a:solidFill>
+                  <a:schemeClr val="tx1"/>
+                </a:solidFill>
+                <a:effectLst/>
+                <a:latin typeface="+mn-lt"/>
+                <a:ea typeface="+mn-ea"/>
+                <a:cs typeface="+mn-cs"/>
+              </a:rPr>
+              <a:t>Aus diesen Gründen wäre es sinnvoller den ganzen Aufwand in die derzeitige (</a:t>
+            </a:r>
+            <a:r>
+              <a:rPr lang="de-DE" sz="1200" kern="1200" dirty="0" err="1">
+                <a:solidFill>
+                  <a:schemeClr val="tx1"/>
+                </a:solidFill>
+                <a:effectLst/>
+                <a:latin typeface="+mn-lt"/>
+                <a:ea typeface="+mn-ea"/>
+                <a:cs typeface="+mn-cs"/>
+              </a:rPr>
+              <a:t>SuiteCRM</a:t>
+            </a:r>
+            <a:r>
+              <a:rPr lang="de-DE" sz="1200" kern="1200" dirty="0">
+                <a:solidFill>
+                  <a:schemeClr val="tx1"/>
+                </a:solidFill>
+                <a:effectLst/>
+                <a:latin typeface="+mn-lt"/>
+                <a:ea typeface="+mn-ea"/>
+                <a:cs typeface="+mn-cs"/>
+              </a:rPr>
+              <a:t>) zu stecken anstatt eine neue CRM Lösung zu installieren, die nicht allen Anforderungen entspricht und weitere manuelle Anpassungen benötigt. Natürlich ist dies nur dann der Fall, wenn am derzeitigen CRM alle fehlenden Anforderungen gedeckt werden. </a:t>
+            </a:r>
+            <a:endParaRPr lang="de-AT" sz="1200" kern="1200" dirty="0">
+              <a:solidFill>
+                <a:schemeClr val="tx1"/>
+              </a:solidFill>
+              <a:effectLst/>
+              <a:latin typeface="+mn-lt"/>
+              <a:ea typeface="+mn-ea"/>
+              <a:cs typeface="+mn-cs"/>
+            </a:endParaRPr>
+          </a:p>
+          <a:p>
+            <a:r>
+              <a:rPr lang="de-DE" sz="1200" kern="1200" dirty="0">
+                <a:solidFill>
+                  <a:schemeClr val="tx1"/>
+                </a:solidFill>
+                <a:effectLst/>
+                <a:latin typeface="+mn-lt"/>
+                <a:ea typeface="+mn-ea"/>
+                <a:cs typeface="+mn-cs"/>
+              </a:rPr>
+              <a:t> </a:t>
+            </a:r>
+            <a:endParaRPr lang="de-AT" sz="1200" kern="1200" dirty="0">
+              <a:solidFill>
+                <a:schemeClr val="tx1"/>
+              </a:solidFill>
+              <a:effectLst/>
+              <a:latin typeface="+mn-lt"/>
+              <a:ea typeface="+mn-ea"/>
+              <a:cs typeface="+mn-cs"/>
+            </a:endParaRPr>
+          </a:p>
+          <a:p>
+            <a:endParaRPr lang="de-AT" dirty="0"/>
           </a:p>
         </p:txBody>
       </p:sp>
@@ -2649,7 +3904,7 @@
     </p:spTree>
     <p:extLst>
       <p:ext uri="{BB962C8B-B14F-4D97-AF65-F5344CB8AC3E}">
-        <p14:creationId xmlns:p14="http://schemas.microsoft.com/office/powerpoint/2010/main" val="2240075764"/>
+        <p14:creationId xmlns:p14="http://schemas.microsoft.com/office/powerpoint/2010/main" val="2900576845"/>
       </p:ext>
     </p:extLst>
   </p:cSld>
@@ -8298,18 +9553,36 @@
         </p:nvSpPr>
         <p:spPr>
           <a:xfrm>
-            <a:off x="549322" y="1541402"/>
-            <a:ext cx="7938000" cy="938696"/>
+            <a:off x="549516" y="1337534"/>
+            <a:ext cx="7938000" cy="4502762"/>
           </a:xfrm>
         </p:spPr>
         <p:txBody>
           <a:bodyPr/>
           <a:lstStyle/>
           <a:p>
+            <a:endParaRPr lang="de-AT" dirty="0"/>
+          </a:p>
+          <a:p>
+            <a:endParaRPr lang="de-AT" dirty="0"/>
+          </a:p>
+          <a:p>
+            <a:endParaRPr lang="de-AT" dirty="0"/>
+          </a:p>
+          <a:p>
+            <a:r>
+              <a:rPr lang="de-AT" dirty="0" err="1"/>
+              <a:t>Odoo</a:t>
+            </a:r>
             <a:r>
               <a:rPr lang="de-AT" dirty="0"/>
-              <a:t>Gantt-Diagramm als Projektplan in Microsoft Excel</a:t>
-            </a:r>
+              <a:t> CRM vs. Derzeitiges </a:t>
+            </a:r>
+            <a:r>
+              <a:rPr lang="de-AT" dirty="0" err="1"/>
+              <a:t>SuiteCRM</a:t>
+            </a:r>
+            <a:endParaRPr lang="de-AT" dirty="0"/>
           </a:p>
         </p:txBody>
       </p:sp>
@@ -8399,7 +9672,1164 @@
           <a:p>
             <a:r>
               <a:rPr lang="de-AT" dirty="0"/>
-              <a:t>Projektplan</a:t>
+              <a:t>Fazit</a:t>
+            </a:r>
+          </a:p>
+        </p:txBody>
+      </p:sp>
+    </p:spTree>
+    <p:extLst>
+      <p:ext uri="{BB962C8B-B14F-4D97-AF65-F5344CB8AC3E}">
+        <p14:creationId xmlns:p14="http://schemas.microsoft.com/office/powerpoint/2010/main" val="1629711748"/>
+      </p:ext>
+    </p:extLst>
+  </p:cSld>
+  <p:clrMapOvr>
+    <a:masterClrMapping/>
+  </p:clrMapOvr>
+</p:sld>
+</file>
+
+<file path=ppt/slides/slide11.xml><?xml version="1.0" encoding="utf-8"?>
+<p:sld xmlns:a="http://schemas.openxmlformats.org/drawingml/2006/main" xmlns:r="http://schemas.openxmlformats.org/officeDocument/2006/relationships" xmlns:p="http://schemas.openxmlformats.org/presentationml/2006/main">
+  <p:cSld>
+    <p:spTree>
+      <p:nvGrpSpPr>
+        <p:cNvPr id="1" name=""/>
+        <p:cNvGrpSpPr/>
+        <p:nvPr/>
+      </p:nvGrpSpPr>
+      <p:grpSpPr>
+        <a:xfrm>
+          <a:off x="0" y="0"/>
+          <a:ext cx="0" cy="0"/>
+          <a:chOff x="0" y="0"/>
+          <a:chExt cx="0" cy="0"/>
+        </a:xfrm>
+      </p:grpSpPr>
+      <p:sp>
+        <p:nvSpPr>
+          <p:cNvPr id="4" name="Fußzeilenplatzhalter 3">
+            <a:extLst>
+              <a:ext uri="{FF2B5EF4-FFF2-40B4-BE49-F238E27FC236}">
+                <a16:creationId xmlns:a16="http://schemas.microsoft.com/office/drawing/2014/main" id="{506052DC-7049-4393-B1C5-754A14BCDAFA}"/>
+              </a:ext>
+            </a:extLst>
+          </p:cNvPr>
+          <p:cNvSpPr>
+            <a:spLocks noGrp="1"/>
+          </p:cNvSpPr>
+          <p:nvPr>
+            <p:ph type="ftr" sz="quarter" idx="16"/>
+          </p:nvPr>
+        </p:nvSpPr>
+        <p:spPr>
+          <a:xfrm>
+            <a:off x="4273550" y="6395540"/>
+            <a:ext cx="3086100" cy="365125"/>
+          </a:xfrm>
+        </p:spPr>
+        <p:txBody>
+          <a:bodyPr/>
+          <a:lstStyle/>
+          <a:p>
+            <a:r>
+              <a:rPr lang="de-AT" noProof="0" dirty="0"/>
+              <a:t>LVA-Nr.: 256.002</a:t>
+            </a:r>
+          </a:p>
+        </p:txBody>
+      </p:sp>
+      <p:sp>
+        <p:nvSpPr>
+          <p:cNvPr id="5" name="Foliennummernplatzhalter 4">
+            <a:extLst>
+              <a:ext uri="{FF2B5EF4-FFF2-40B4-BE49-F238E27FC236}">
+                <a16:creationId xmlns:a16="http://schemas.microsoft.com/office/drawing/2014/main" id="{5BE28071-B805-4E3A-8BBA-20469274180D}"/>
+              </a:ext>
+            </a:extLst>
+          </p:cNvPr>
+          <p:cNvSpPr>
+            <a:spLocks noGrp="1"/>
+          </p:cNvSpPr>
+          <p:nvPr>
+            <p:ph type="sldNum" sz="quarter" idx="17"/>
+          </p:nvPr>
+        </p:nvSpPr>
+        <p:spPr/>
+        <p:txBody>
+          <a:bodyPr/>
+          <a:lstStyle/>
+          <a:p>
+            <a:fld id="{68F3185B-C653-42AE-8B74-FF214C291574}" type="slidenum">
+              <a:rPr lang="en-US" smtClean="0"/>
+              <a:pPr/>
+              <a:t>11</a:t>
+            </a:fld>
+            <a:endParaRPr lang="en-US"/>
+          </a:p>
+        </p:txBody>
+      </p:sp>
+      <p:sp>
+        <p:nvSpPr>
+          <p:cNvPr id="6" name="Titel 5">
+            <a:extLst>
+              <a:ext uri="{FF2B5EF4-FFF2-40B4-BE49-F238E27FC236}">
+                <a16:creationId xmlns:a16="http://schemas.microsoft.com/office/drawing/2014/main" id="{ECD1BE86-B780-416C-8EAA-2B4B75B29378}"/>
+              </a:ext>
+            </a:extLst>
+          </p:cNvPr>
+          <p:cNvSpPr>
+            <a:spLocks noGrp="1"/>
+          </p:cNvSpPr>
+          <p:nvPr>
+            <p:ph type="title"/>
+          </p:nvPr>
+        </p:nvSpPr>
+        <p:spPr>
+          <a:xfrm>
+            <a:off x="549322" y="590453"/>
+            <a:ext cx="7938194" cy="938696"/>
+          </a:xfrm>
+        </p:spPr>
+        <p:txBody>
+          <a:bodyPr/>
+          <a:lstStyle/>
+          <a:p>
+            <a:r>
+              <a:rPr lang="de-AT" sz="3200" dirty="0"/>
+              <a:t>Vorschlag Buy-Entscheidung</a:t>
+            </a:r>
+            <a:br>
+              <a:rPr lang="de-AT" sz="3200" dirty="0"/>
+            </a:br>
+            <a:r>
+              <a:rPr lang="de-AT" sz="3200" dirty="0"/>
+              <a:t>inkl. Begründung</a:t>
+            </a:r>
+          </a:p>
+        </p:txBody>
+      </p:sp>
+      <p:sp>
+        <p:nvSpPr>
+          <p:cNvPr id="7" name="Textplatzhalter 1">
+            <a:extLst>
+              <a:ext uri="{FF2B5EF4-FFF2-40B4-BE49-F238E27FC236}">
+                <a16:creationId xmlns:a16="http://schemas.microsoft.com/office/drawing/2014/main" id="{2151D615-468A-40DC-95EC-4F88057DFA8D}"/>
+              </a:ext>
+            </a:extLst>
+          </p:cNvPr>
+          <p:cNvSpPr txBox="1">
+            <a:spLocks/>
+          </p:cNvSpPr>
+          <p:nvPr/>
+        </p:nvSpPr>
+        <p:spPr>
+          <a:xfrm>
+            <a:off x="549516" y="1337534"/>
+            <a:ext cx="7938000" cy="4502762"/>
+          </a:xfrm>
+          <a:prstGeom prst="rect">
+            <a:avLst/>
+          </a:prstGeom>
+        </p:spPr>
+        <p:txBody>
+          <a:bodyPr vert="horz" lIns="91440" tIns="45720" rIns="91440" bIns="45720" rtlCol="0">
+            <a:noAutofit/>
+          </a:bodyPr>
+          <a:lstStyle>
+            <a:lvl1pPr marL="0" indent="0" algn="l" defTabSz="914400" rtl="0" eaLnBrk="1" latinLnBrk="0" hangingPunct="1">
+              <a:lnSpc>
+                <a:spcPct val="105000"/>
+              </a:lnSpc>
+              <a:spcBef>
+                <a:spcPts val="1000"/>
+              </a:spcBef>
+              <a:spcAft>
+                <a:spcPts val="600"/>
+              </a:spcAft>
+              <a:buSzPct val="90000"/>
+              <a:buFontTx/>
+              <a:buNone/>
+              <a:defRPr lang="de-AT" sz="1700" kern="1200" baseline="0" noProof="0" dirty="0" smtClean="0">
+                <a:solidFill>
+                  <a:schemeClr val="tx1"/>
+                </a:solidFill>
+                <a:latin typeface="+mj-lt"/>
+                <a:ea typeface="+mn-ea"/>
+                <a:cs typeface="+mn-cs"/>
+              </a:defRPr>
+            </a:lvl1pPr>
+            <a:lvl2pPr marL="266700" indent="-266700" algn="l" defTabSz="914400" rtl="0" eaLnBrk="1" latinLnBrk="0" hangingPunct="1">
+              <a:lnSpc>
+                <a:spcPct val="105000"/>
+              </a:lnSpc>
+              <a:spcBef>
+                <a:spcPts val="0"/>
+              </a:spcBef>
+              <a:spcAft>
+                <a:spcPts val="600"/>
+              </a:spcAft>
+              <a:buSzPct val="90000"/>
+              <a:buFont typeface="Wingdings 2" panose="05020102010507070707" pitchFamily="18" charset="2"/>
+              <a:buChar char=""/>
+              <a:defRPr sz="1500" kern="1200">
+                <a:solidFill>
+                  <a:schemeClr val="tx1"/>
+                </a:solidFill>
+                <a:latin typeface="+mn-lt"/>
+                <a:ea typeface="+mn-ea"/>
+                <a:cs typeface="+mn-cs"/>
+              </a:defRPr>
+            </a:lvl2pPr>
+            <a:lvl3pPr marL="936000" indent="-288000" algn="l" defTabSz="914400" rtl="0" eaLnBrk="1" latinLnBrk="0" hangingPunct="1">
+              <a:lnSpc>
+                <a:spcPct val="105000"/>
+              </a:lnSpc>
+              <a:spcBef>
+                <a:spcPts val="0"/>
+              </a:spcBef>
+              <a:spcAft>
+                <a:spcPts val="600"/>
+              </a:spcAft>
+              <a:buFont typeface="Wingdings 2" panose="05020102010507070707" pitchFamily="18" charset="2"/>
+              <a:buChar char=""/>
+              <a:defRPr sz="1600" kern="1200">
+                <a:solidFill>
+                  <a:schemeClr val="tx1"/>
+                </a:solidFill>
+                <a:latin typeface="+mn-lt"/>
+                <a:ea typeface="+mn-ea"/>
+                <a:cs typeface="+mn-cs"/>
+              </a:defRPr>
+            </a:lvl3pPr>
+            <a:lvl4pPr marL="1224000" indent="-288000" algn="l" defTabSz="914400" rtl="0" eaLnBrk="1" latinLnBrk="0" hangingPunct="1">
+              <a:lnSpc>
+                <a:spcPct val="105000"/>
+              </a:lnSpc>
+              <a:spcBef>
+                <a:spcPts val="0"/>
+              </a:spcBef>
+              <a:spcAft>
+                <a:spcPts val="600"/>
+              </a:spcAft>
+              <a:buFont typeface="Wingdings 2" panose="05020102010507070707" pitchFamily="18" charset="2"/>
+              <a:buChar char=""/>
+              <a:defRPr sz="1500" kern="1200">
+                <a:solidFill>
+                  <a:schemeClr val="tx1"/>
+                </a:solidFill>
+                <a:latin typeface="+mn-lt"/>
+                <a:ea typeface="+mn-ea"/>
+                <a:cs typeface="+mn-cs"/>
+              </a:defRPr>
+            </a:lvl4pPr>
+            <a:lvl5pPr marL="1512000" indent="-288000" algn="l" defTabSz="914400" rtl="0" eaLnBrk="1" latinLnBrk="0" hangingPunct="1">
+              <a:lnSpc>
+                <a:spcPct val="105000"/>
+              </a:lnSpc>
+              <a:spcBef>
+                <a:spcPts val="0"/>
+              </a:spcBef>
+              <a:spcAft>
+                <a:spcPts val="600"/>
+              </a:spcAft>
+              <a:buFont typeface="Wingdings 2" panose="05020102010507070707" pitchFamily="18" charset="2"/>
+              <a:buChar char=""/>
+              <a:defRPr sz="1400" kern="1200">
+                <a:solidFill>
+                  <a:schemeClr val="tx1"/>
+                </a:solidFill>
+                <a:latin typeface="+mn-lt"/>
+                <a:ea typeface="+mn-ea"/>
+                <a:cs typeface="+mn-cs"/>
+              </a:defRPr>
+            </a:lvl5pPr>
+            <a:lvl6pPr marL="2514600" indent="-228600" algn="l" defTabSz="914400" rtl="0" eaLnBrk="1" latinLnBrk="0" hangingPunct="1">
+              <a:lnSpc>
+                <a:spcPct val="90000"/>
+              </a:lnSpc>
+              <a:spcBef>
+                <a:spcPts val="500"/>
+              </a:spcBef>
+              <a:buFont typeface="Arial" panose="020B0604020202020204" pitchFamily="34" charset="0"/>
+              <a:buChar char="•"/>
+              <a:defRPr sz="1800" kern="1200">
+                <a:solidFill>
+                  <a:schemeClr val="tx1"/>
+                </a:solidFill>
+                <a:latin typeface="+mn-lt"/>
+                <a:ea typeface="+mn-ea"/>
+                <a:cs typeface="+mn-cs"/>
+              </a:defRPr>
+            </a:lvl6pPr>
+            <a:lvl7pPr marL="2971800" indent="-228600" algn="l" defTabSz="914400" rtl="0" eaLnBrk="1" latinLnBrk="0" hangingPunct="1">
+              <a:lnSpc>
+                <a:spcPct val="90000"/>
+              </a:lnSpc>
+              <a:spcBef>
+                <a:spcPts val="500"/>
+              </a:spcBef>
+              <a:buFont typeface="Arial" panose="020B0604020202020204" pitchFamily="34" charset="0"/>
+              <a:buChar char="•"/>
+              <a:defRPr sz="1800" kern="1200">
+                <a:solidFill>
+                  <a:schemeClr val="tx1"/>
+                </a:solidFill>
+                <a:latin typeface="+mn-lt"/>
+                <a:ea typeface="+mn-ea"/>
+                <a:cs typeface="+mn-cs"/>
+              </a:defRPr>
+            </a:lvl7pPr>
+            <a:lvl8pPr marL="3429000" indent="-228600" algn="l" defTabSz="914400" rtl="0" eaLnBrk="1" latinLnBrk="0" hangingPunct="1">
+              <a:lnSpc>
+                <a:spcPct val="90000"/>
+              </a:lnSpc>
+              <a:spcBef>
+                <a:spcPts val="500"/>
+              </a:spcBef>
+              <a:buFont typeface="Arial" panose="020B0604020202020204" pitchFamily="34" charset="0"/>
+              <a:buChar char="•"/>
+              <a:defRPr sz="1800" kern="1200">
+                <a:solidFill>
+                  <a:schemeClr val="tx1"/>
+                </a:solidFill>
+                <a:latin typeface="+mn-lt"/>
+                <a:ea typeface="+mn-ea"/>
+                <a:cs typeface="+mn-cs"/>
+              </a:defRPr>
+            </a:lvl8pPr>
+            <a:lvl9pPr marL="3886200" indent="-228600" algn="l" defTabSz="914400" rtl="0" eaLnBrk="1" latinLnBrk="0" hangingPunct="1">
+              <a:lnSpc>
+                <a:spcPct val="90000"/>
+              </a:lnSpc>
+              <a:spcBef>
+                <a:spcPts val="500"/>
+              </a:spcBef>
+              <a:buFont typeface="Arial" panose="020B0604020202020204" pitchFamily="34" charset="0"/>
+              <a:buChar char="•"/>
+              <a:defRPr sz="1800" kern="1200">
+                <a:solidFill>
+                  <a:schemeClr val="tx1"/>
+                </a:solidFill>
+                <a:latin typeface="+mn-lt"/>
+                <a:ea typeface="+mn-ea"/>
+                <a:cs typeface="+mn-cs"/>
+              </a:defRPr>
+            </a:lvl9pPr>
+          </a:lstStyle>
+          <a:p>
+            <a:endParaRPr lang="de-AT" dirty="0"/>
+          </a:p>
+          <a:p>
+            <a:endParaRPr lang="de-AT" dirty="0"/>
+          </a:p>
+          <a:p>
+            <a:r>
+              <a:rPr lang="de-AT" dirty="0" err="1"/>
+              <a:t>Odoo</a:t>
+            </a:r>
+            <a:r>
+              <a:rPr lang="de-AT" dirty="0"/>
+              <a:t> CRM</a:t>
+            </a:r>
+          </a:p>
+          <a:p>
+            <a:pPr marL="285750" indent="-285750">
+              <a:buFont typeface="Arial" panose="020B0604020202020204" pitchFamily="34" charset="0"/>
+              <a:buChar char="•"/>
+            </a:pPr>
+            <a:r>
+              <a:rPr lang="de-AT" dirty="0"/>
+              <a:t>Erfüllt alle funktionalen Anforderungen</a:t>
+            </a:r>
+          </a:p>
+          <a:p>
+            <a:pPr marL="285750" indent="-285750">
+              <a:buFont typeface="Arial" panose="020B0604020202020204" pitchFamily="34" charset="0"/>
+              <a:buChar char="•"/>
+            </a:pPr>
+            <a:r>
+              <a:rPr lang="de-AT" dirty="0"/>
+              <a:t>Nice-to-</a:t>
+            </a:r>
+            <a:r>
+              <a:rPr lang="de-AT" dirty="0" err="1"/>
+              <a:t>have</a:t>
+            </a:r>
+            <a:r>
+              <a:rPr lang="de-AT" dirty="0"/>
+              <a:t> Anforderungen werden umgesetzt</a:t>
+            </a:r>
+          </a:p>
+          <a:p>
+            <a:pPr marL="285750" indent="-285750">
+              <a:buFont typeface="Arial" panose="020B0604020202020204" pitchFamily="34" charset="0"/>
+              <a:buChar char="•"/>
+            </a:pPr>
+            <a:r>
+              <a:rPr lang="de-AT" dirty="0"/>
+              <a:t>Open Source Lösung mit Erweiterbarkeit (inkl. Dokumentation)</a:t>
+            </a:r>
+          </a:p>
+          <a:p>
+            <a:pPr marL="285750" indent="-285750">
+              <a:buFont typeface="Arial" panose="020B0604020202020204" pitchFamily="34" charset="0"/>
+              <a:buChar char="•"/>
+            </a:pPr>
+            <a:r>
+              <a:rPr lang="de-AT" dirty="0"/>
+              <a:t>Höhere Performance als bestehende Lösung</a:t>
+            </a:r>
+          </a:p>
+        </p:txBody>
+      </p:sp>
+    </p:spTree>
+    <p:extLst>
+      <p:ext uri="{BB962C8B-B14F-4D97-AF65-F5344CB8AC3E}">
+        <p14:creationId xmlns:p14="http://schemas.microsoft.com/office/powerpoint/2010/main" val="1325382374"/>
+      </p:ext>
+    </p:extLst>
+  </p:cSld>
+  <p:clrMapOvr>
+    <a:masterClrMapping/>
+  </p:clrMapOvr>
+</p:sld>
+</file>
+
+<file path=ppt/slides/slide12.xml><?xml version="1.0" encoding="utf-8"?>
+<p:sld xmlns:a="http://schemas.openxmlformats.org/drawingml/2006/main" xmlns:r="http://schemas.openxmlformats.org/officeDocument/2006/relationships" xmlns:p="http://schemas.openxmlformats.org/presentationml/2006/main">
+  <p:cSld>
+    <p:spTree>
+      <p:nvGrpSpPr>
+        <p:cNvPr id="1" name=""/>
+        <p:cNvGrpSpPr/>
+        <p:nvPr/>
+      </p:nvGrpSpPr>
+      <p:grpSpPr>
+        <a:xfrm>
+          <a:off x="0" y="0"/>
+          <a:ext cx="0" cy="0"/>
+          <a:chOff x="0" y="0"/>
+          <a:chExt cx="0" cy="0"/>
+        </a:xfrm>
+      </p:grpSpPr>
+      <p:sp>
+        <p:nvSpPr>
+          <p:cNvPr id="4" name="Fußzeilenplatzhalter 3">
+            <a:extLst>
+              <a:ext uri="{FF2B5EF4-FFF2-40B4-BE49-F238E27FC236}">
+                <a16:creationId xmlns:a16="http://schemas.microsoft.com/office/drawing/2014/main" id="{506052DC-7049-4393-B1C5-754A14BCDAFA}"/>
+              </a:ext>
+            </a:extLst>
+          </p:cNvPr>
+          <p:cNvSpPr>
+            <a:spLocks noGrp="1"/>
+          </p:cNvSpPr>
+          <p:nvPr>
+            <p:ph type="ftr" sz="quarter" idx="16"/>
+          </p:nvPr>
+        </p:nvSpPr>
+        <p:spPr>
+          <a:xfrm>
+            <a:off x="4273550" y="6395540"/>
+            <a:ext cx="3086100" cy="365125"/>
+          </a:xfrm>
+        </p:spPr>
+        <p:txBody>
+          <a:bodyPr/>
+          <a:lstStyle/>
+          <a:p>
+            <a:r>
+              <a:rPr lang="de-AT" noProof="0" dirty="0"/>
+              <a:t>LVA-Nr.: 256.002</a:t>
+            </a:r>
+          </a:p>
+        </p:txBody>
+      </p:sp>
+      <p:sp>
+        <p:nvSpPr>
+          <p:cNvPr id="5" name="Foliennummernplatzhalter 4">
+            <a:extLst>
+              <a:ext uri="{FF2B5EF4-FFF2-40B4-BE49-F238E27FC236}">
+                <a16:creationId xmlns:a16="http://schemas.microsoft.com/office/drawing/2014/main" id="{5BE28071-B805-4E3A-8BBA-20469274180D}"/>
+              </a:ext>
+            </a:extLst>
+          </p:cNvPr>
+          <p:cNvSpPr>
+            <a:spLocks noGrp="1"/>
+          </p:cNvSpPr>
+          <p:nvPr>
+            <p:ph type="sldNum" sz="quarter" idx="17"/>
+          </p:nvPr>
+        </p:nvSpPr>
+        <p:spPr/>
+        <p:txBody>
+          <a:bodyPr/>
+          <a:lstStyle/>
+          <a:p>
+            <a:fld id="{68F3185B-C653-42AE-8B74-FF214C291574}" type="slidenum">
+              <a:rPr lang="en-US" smtClean="0"/>
+              <a:pPr/>
+              <a:t>12</a:t>
+            </a:fld>
+            <a:endParaRPr lang="en-US"/>
+          </a:p>
+        </p:txBody>
+      </p:sp>
+      <p:sp>
+        <p:nvSpPr>
+          <p:cNvPr id="6" name="Titel 5">
+            <a:extLst>
+              <a:ext uri="{FF2B5EF4-FFF2-40B4-BE49-F238E27FC236}">
+                <a16:creationId xmlns:a16="http://schemas.microsoft.com/office/drawing/2014/main" id="{ECD1BE86-B780-416C-8EAA-2B4B75B29378}"/>
+              </a:ext>
+            </a:extLst>
+          </p:cNvPr>
+          <p:cNvSpPr>
+            <a:spLocks noGrp="1"/>
+          </p:cNvSpPr>
+          <p:nvPr>
+            <p:ph type="title"/>
+          </p:nvPr>
+        </p:nvSpPr>
+        <p:spPr>
+          <a:xfrm>
+            <a:off x="549322" y="651700"/>
+            <a:ext cx="8594678" cy="938696"/>
+          </a:xfrm>
+        </p:spPr>
+        <p:txBody>
+          <a:bodyPr/>
+          <a:lstStyle/>
+          <a:p>
+            <a:r>
+              <a:rPr lang="de-AT" dirty="0"/>
+              <a:t>Einblick </a:t>
+            </a:r>
+            <a:r>
+              <a:rPr lang="de-AT" dirty="0" err="1"/>
+              <a:t>odoo</a:t>
+            </a:r>
+            <a:r>
+              <a:rPr lang="de-AT" dirty="0"/>
+              <a:t> – </a:t>
+            </a:r>
+            <a:r>
+              <a:rPr lang="de-AT" dirty="0" err="1"/>
+              <a:t>Crm</a:t>
+            </a:r>
+            <a:r>
+              <a:rPr lang="de-AT" dirty="0"/>
+              <a:t> System</a:t>
+            </a:r>
+          </a:p>
+        </p:txBody>
+      </p:sp>
+      <p:pic>
+        <p:nvPicPr>
+          <p:cNvPr id="8" name="Grafik 7">
+            <a:extLst>
+              <a:ext uri="{FF2B5EF4-FFF2-40B4-BE49-F238E27FC236}">
+                <a16:creationId xmlns:a16="http://schemas.microsoft.com/office/drawing/2014/main" id="{8B9AA725-DD4A-40D2-AF4F-3573EE001E4B}"/>
+              </a:ext>
+            </a:extLst>
+          </p:cNvPr>
+          <p:cNvPicPr>
+            <a:picLocks noChangeAspect="1"/>
+          </p:cNvPicPr>
+          <p:nvPr/>
+        </p:nvPicPr>
+        <p:blipFill>
+          <a:blip r:embed="rId3">
+            <a:extLst>
+              <a:ext uri="{28A0092B-C50C-407E-A947-70E740481C1C}">
+                <a14:useLocalDpi xmlns:a14="http://schemas.microsoft.com/office/drawing/2010/main" val="0"/>
+              </a:ext>
+            </a:extLst>
+          </a:blip>
+          <a:stretch>
+            <a:fillRect/>
+          </a:stretch>
+        </p:blipFill>
+        <p:spPr>
+          <a:xfrm>
+            <a:off x="266005" y="1425480"/>
+            <a:ext cx="8611990" cy="4448175"/>
+          </a:xfrm>
+          <a:prstGeom prst="rect">
+            <a:avLst/>
+          </a:prstGeom>
+        </p:spPr>
+      </p:pic>
+    </p:spTree>
+    <p:extLst>
+      <p:ext uri="{BB962C8B-B14F-4D97-AF65-F5344CB8AC3E}">
+        <p14:creationId xmlns:p14="http://schemas.microsoft.com/office/powerpoint/2010/main" val="3557033798"/>
+      </p:ext>
+    </p:extLst>
+  </p:cSld>
+  <p:clrMapOvr>
+    <a:masterClrMapping/>
+  </p:clrMapOvr>
+</p:sld>
+</file>
+
+<file path=ppt/slides/slide13.xml><?xml version="1.0" encoding="utf-8"?>
+<p:sld xmlns:a="http://schemas.openxmlformats.org/drawingml/2006/main" xmlns:r="http://schemas.openxmlformats.org/officeDocument/2006/relationships" xmlns:p="http://schemas.openxmlformats.org/presentationml/2006/main">
+  <p:cSld>
+    <p:spTree>
+      <p:nvGrpSpPr>
+        <p:cNvPr id="1" name=""/>
+        <p:cNvGrpSpPr/>
+        <p:nvPr/>
+      </p:nvGrpSpPr>
+      <p:grpSpPr>
+        <a:xfrm>
+          <a:off x="0" y="0"/>
+          <a:ext cx="0" cy="0"/>
+          <a:chOff x="0" y="0"/>
+          <a:chExt cx="0" cy="0"/>
+        </a:xfrm>
+      </p:grpSpPr>
+      <p:sp>
+        <p:nvSpPr>
+          <p:cNvPr id="4" name="Fußzeilenplatzhalter 3">
+            <a:extLst>
+              <a:ext uri="{FF2B5EF4-FFF2-40B4-BE49-F238E27FC236}">
+                <a16:creationId xmlns:a16="http://schemas.microsoft.com/office/drawing/2014/main" id="{506052DC-7049-4393-B1C5-754A14BCDAFA}"/>
+              </a:ext>
+            </a:extLst>
+          </p:cNvPr>
+          <p:cNvSpPr>
+            <a:spLocks noGrp="1"/>
+          </p:cNvSpPr>
+          <p:nvPr>
+            <p:ph type="ftr" sz="quarter" idx="16"/>
+          </p:nvPr>
+        </p:nvSpPr>
+        <p:spPr>
+          <a:xfrm>
+            <a:off x="4273550" y="6395540"/>
+            <a:ext cx="3086100" cy="365125"/>
+          </a:xfrm>
+        </p:spPr>
+        <p:txBody>
+          <a:bodyPr/>
+          <a:lstStyle/>
+          <a:p>
+            <a:r>
+              <a:rPr lang="de-AT" noProof="0" dirty="0"/>
+              <a:t>LVA-Nr.: 256.002</a:t>
+            </a:r>
+          </a:p>
+        </p:txBody>
+      </p:sp>
+      <p:sp>
+        <p:nvSpPr>
+          <p:cNvPr id="5" name="Foliennummernplatzhalter 4">
+            <a:extLst>
+              <a:ext uri="{FF2B5EF4-FFF2-40B4-BE49-F238E27FC236}">
+                <a16:creationId xmlns:a16="http://schemas.microsoft.com/office/drawing/2014/main" id="{5BE28071-B805-4E3A-8BBA-20469274180D}"/>
+              </a:ext>
+            </a:extLst>
+          </p:cNvPr>
+          <p:cNvSpPr>
+            <a:spLocks noGrp="1"/>
+          </p:cNvSpPr>
+          <p:nvPr>
+            <p:ph type="sldNum" sz="quarter" idx="17"/>
+          </p:nvPr>
+        </p:nvSpPr>
+        <p:spPr/>
+        <p:txBody>
+          <a:bodyPr/>
+          <a:lstStyle/>
+          <a:p>
+            <a:fld id="{68F3185B-C653-42AE-8B74-FF214C291574}" type="slidenum">
+              <a:rPr lang="en-US" smtClean="0"/>
+              <a:pPr/>
+              <a:t>13</a:t>
+            </a:fld>
+            <a:endParaRPr lang="en-US"/>
+          </a:p>
+        </p:txBody>
+      </p:sp>
+      <p:sp>
+        <p:nvSpPr>
+          <p:cNvPr id="6" name="Titel 5">
+            <a:extLst>
+              <a:ext uri="{FF2B5EF4-FFF2-40B4-BE49-F238E27FC236}">
+                <a16:creationId xmlns:a16="http://schemas.microsoft.com/office/drawing/2014/main" id="{ECD1BE86-B780-416C-8EAA-2B4B75B29378}"/>
+              </a:ext>
+            </a:extLst>
+          </p:cNvPr>
+          <p:cNvSpPr>
+            <a:spLocks noGrp="1"/>
+          </p:cNvSpPr>
+          <p:nvPr>
+            <p:ph type="title"/>
+          </p:nvPr>
+        </p:nvSpPr>
+        <p:spPr>
+          <a:xfrm>
+            <a:off x="549322" y="651700"/>
+            <a:ext cx="8594678" cy="938696"/>
+          </a:xfrm>
+        </p:spPr>
+        <p:txBody>
+          <a:bodyPr/>
+          <a:lstStyle/>
+          <a:p>
+            <a:r>
+              <a:rPr lang="de-AT" dirty="0"/>
+              <a:t>Einblick </a:t>
+            </a:r>
+            <a:r>
+              <a:rPr lang="de-AT" dirty="0" err="1"/>
+              <a:t>odoo</a:t>
+            </a:r>
+            <a:r>
+              <a:rPr lang="de-AT" dirty="0"/>
+              <a:t> – </a:t>
+            </a:r>
+            <a:r>
+              <a:rPr lang="de-AT" dirty="0" err="1"/>
+              <a:t>Crm</a:t>
+            </a:r>
+            <a:r>
+              <a:rPr lang="de-AT" dirty="0"/>
+              <a:t> System</a:t>
+            </a:r>
+          </a:p>
+        </p:txBody>
+      </p:sp>
+      <p:pic>
+        <p:nvPicPr>
+          <p:cNvPr id="8" name="Grafik 7">
+            <a:extLst>
+              <a:ext uri="{FF2B5EF4-FFF2-40B4-BE49-F238E27FC236}">
+                <a16:creationId xmlns:a16="http://schemas.microsoft.com/office/drawing/2014/main" id="{8B9AA725-DD4A-40D2-AF4F-3573EE001E4B}"/>
+              </a:ext>
+            </a:extLst>
+          </p:cNvPr>
+          <p:cNvPicPr>
+            <a:picLocks noChangeAspect="1"/>
+          </p:cNvPicPr>
+          <p:nvPr/>
+        </p:nvPicPr>
+        <p:blipFill>
+          <a:blip r:embed="rId3">
+            <a:extLst>
+              <a:ext uri="{28A0092B-C50C-407E-A947-70E740481C1C}">
+                <a14:useLocalDpi xmlns:a14="http://schemas.microsoft.com/office/drawing/2010/main" val="0"/>
+              </a:ext>
+            </a:extLst>
+          </a:blip>
+          <a:stretch>
+            <a:fillRect/>
+          </a:stretch>
+        </p:blipFill>
+        <p:spPr>
+          <a:xfrm>
+            <a:off x="931954" y="2145634"/>
+            <a:ext cx="6683192" cy="3180397"/>
+          </a:xfrm>
+          <a:prstGeom prst="rect">
+            <a:avLst/>
+          </a:prstGeom>
+        </p:spPr>
+      </p:pic>
+    </p:spTree>
+    <p:extLst>
+      <p:ext uri="{BB962C8B-B14F-4D97-AF65-F5344CB8AC3E}">
+        <p14:creationId xmlns:p14="http://schemas.microsoft.com/office/powerpoint/2010/main" val="2415531234"/>
+      </p:ext>
+    </p:extLst>
+  </p:cSld>
+  <p:clrMapOvr>
+    <a:masterClrMapping/>
+  </p:clrMapOvr>
+</p:sld>
+</file>
+
+<file path=ppt/slides/slide14.xml><?xml version="1.0" encoding="utf-8"?>
+<p:sld xmlns:a="http://schemas.openxmlformats.org/drawingml/2006/main" xmlns:r="http://schemas.openxmlformats.org/officeDocument/2006/relationships" xmlns:p="http://schemas.openxmlformats.org/presentationml/2006/main">
+  <p:cSld>
+    <p:spTree>
+      <p:nvGrpSpPr>
+        <p:cNvPr id="1" name=""/>
+        <p:cNvGrpSpPr/>
+        <p:nvPr/>
+      </p:nvGrpSpPr>
+      <p:grpSpPr>
+        <a:xfrm>
+          <a:off x="0" y="0"/>
+          <a:ext cx="0" cy="0"/>
+          <a:chOff x="0" y="0"/>
+          <a:chExt cx="0" cy="0"/>
+        </a:xfrm>
+      </p:grpSpPr>
+      <p:sp>
+        <p:nvSpPr>
+          <p:cNvPr id="2" name="Textplatzhalter 1">
+            <a:extLst>
+              <a:ext uri="{FF2B5EF4-FFF2-40B4-BE49-F238E27FC236}">
+                <a16:creationId xmlns:a16="http://schemas.microsoft.com/office/drawing/2014/main" id="{62C85FB2-1022-4081-ABAD-803398685F11}"/>
+              </a:ext>
+            </a:extLst>
+          </p:cNvPr>
+          <p:cNvSpPr>
+            <a:spLocks noGrp="1"/>
+          </p:cNvSpPr>
+          <p:nvPr>
+            <p:ph type="body" sz="quarter" idx="13"/>
+          </p:nvPr>
+        </p:nvSpPr>
+        <p:spPr>
+          <a:xfrm>
+            <a:off x="549322" y="1863305"/>
+            <a:ext cx="7938000" cy="3774441"/>
+          </a:xfrm>
+        </p:spPr>
+        <p:txBody>
+          <a:bodyPr/>
+          <a:lstStyle/>
+          <a:p>
+            <a:pPr marL="285750" lvl="0" indent="-285750">
+              <a:buFont typeface="Arial" panose="020B0604020202020204" pitchFamily="34" charset="0"/>
+              <a:buChar char="•"/>
+            </a:pPr>
+            <a:r>
+              <a:rPr lang="de-DE" dirty="0"/>
+              <a:t>Installation am Server</a:t>
+            </a:r>
+          </a:p>
+          <a:p>
+            <a:pPr marL="285750" lvl="0" indent="-285750">
+              <a:buFont typeface="Arial" panose="020B0604020202020204" pitchFamily="34" charset="0"/>
+              <a:buChar char="•"/>
+            </a:pPr>
+            <a:r>
+              <a:rPr lang="de-DE" dirty="0"/>
+              <a:t>Datenexport &amp; -import</a:t>
+            </a:r>
+          </a:p>
+          <a:p>
+            <a:pPr marL="285750" lvl="0" indent="-285750">
+              <a:buFont typeface="Arial" panose="020B0604020202020204" pitchFamily="34" charset="0"/>
+              <a:buChar char="•"/>
+            </a:pPr>
+            <a:r>
+              <a:rPr lang="de-DE" dirty="0"/>
+              <a:t>Benutzerhandbuch &amp; Tutorials betrachten</a:t>
+            </a:r>
+            <a:endParaRPr lang="de-AT" dirty="0"/>
+          </a:p>
+          <a:p>
+            <a:pPr marL="285750" lvl="0" indent="-285750">
+              <a:buFont typeface="Arial" panose="020B0604020202020204" pitchFamily="34" charset="0"/>
+              <a:buChar char="•"/>
+            </a:pPr>
+            <a:r>
+              <a:rPr lang="de-DE" dirty="0"/>
+              <a:t>Konfigurieren nach Anforderungen</a:t>
+            </a:r>
+          </a:p>
+          <a:p>
+            <a:pPr marL="285750" lvl="0" indent="-285750">
+              <a:buFont typeface="Arial" panose="020B0604020202020204" pitchFamily="34" charset="0"/>
+              <a:buChar char="•"/>
+            </a:pPr>
+            <a:r>
+              <a:rPr lang="de-DE" dirty="0"/>
+              <a:t>Optimieren zwecks Usability</a:t>
+            </a:r>
+            <a:endParaRPr lang="de-AT" dirty="0"/>
+          </a:p>
+          <a:p>
+            <a:pPr marL="285750" lvl="0" indent="-285750">
+              <a:buFont typeface="Arial" panose="020B0604020202020204" pitchFamily="34" charset="0"/>
+              <a:buChar char="•"/>
+            </a:pPr>
+            <a:r>
+              <a:rPr lang="de-DE" dirty="0"/>
+              <a:t>Testphase</a:t>
+            </a:r>
+            <a:endParaRPr lang="de-AT" dirty="0"/>
+          </a:p>
+          <a:p>
+            <a:pPr marL="285750" lvl="0" indent="-285750">
+              <a:buFont typeface="Arial" panose="020B0604020202020204" pitchFamily="34" charset="0"/>
+              <a:buChar char="•"/>
+            </a:pPr>
+            <a:r>
+              <a:rPr lang="de-DE" dirty="0"/>
+              <a:t>Abgleich umgesetzter Anforderungen</a:t>
+            </a:r>
+          </a:p>
+          <a:p>
+            <a:pPr marL="285750" lvl="0" indent="-285750">
+              <a:buFont typeface="Arial" panose="020B0604020202020204" pitchFamily="34" charset="0"/>
+              <a:buChar char="•"/>
+            </a:pPr>
+            <a:r>
+              <a:rPr lang="de-DE" dirty="0"/>
+              <a:t>Einschulung mittels Workshops</a:t>
+            </a:r>
+          </a:p>
+          <a:p>
+            <a:pPr lvl="0"/>
+            <a:endParaRPr lang="de-AT" dirty="0"/>
+          </a:p>
+        </p:txBody>
+      </p:sp>
+      <p:sp>
+        <p:nvSpPr>
+          <p:cNvPr id="4" name="Fußzeilenplatzhalter 3">
+            <a:extLst>
+              <a:ext uri="{FF2B5EF4-FFF2-40B4-BE49-F238E27FC236}">
+                <a16:creationId xmlns:a16="http://schemas.microsoft.com/office/drawing/2014/main" id="{506052DC-7049-4393-B1C5-754A14BCDAFA}"/>
+              </a:ext>
+            </a:extLst>
+          </p:cNvPr>
+          <p:cNvSpPr>
+            <a:spLocks noGrp="1"/>
+          </p:cNvSpPr>
+          <p:nvPr>
+            <p:ph type="ftr" sz="quarter" idx="16"/>
+          </p:nvPr>
+        </p:nvSpPr>
+        <p:spPr>
+          <a:xfrm>
+            <a:off x="4273550" y="6395540"/>
+            <a:ext cx="3086100" cy="365125"/>
+          </a:xfrm>
+        </p:spPr>
+        <p:txBody>
+          <a:bodyPr/>
+          <a:lstStyle/>
+          <a:p>
+            <a:r>
+              <a:rPr lang="de-AT" noProof="0" dirty="0"/>
+              <a:t>LVA-Nr.: 256.002</a:t>
+            </a:r>
+          </a:p>
+        </p:txBody>
+      </p:sp>
+      <p:sp>
+        <p:nvSpPr>
+          <p:cNvPr id="5" name="Foliennummernplatzhalter 4">
+            <a:extLst>
+              <a:ext uri="{FF2B5EF4-FFF2-40B4-BE49-F238E27FC236}">
+                <a16:creationId xmlns:a16="http://schemas.microsoft.com/office/drawing/2014/main" id="{5BE28071-B805-4E3A-8BBA-20469274180D}"/>
+              </a:ext>
+            </a:extLst>
+          </p:cNvPr>
+          <p:cNvSpPr>
+            <a:spLocks noGrp="1"/>
+          </p:cNvSpPr>
+          <p:nvPr>
+            <p:ph type="sldNum" sz="quarter" idx="17"/>
+          </p:nvPr>
+        </p:nvSpPr>
+        <p:spPr/>
+        <p:txBody>
+          <a:bodyPr/>
+          <a:lstStyle/>
+          <a:p>
+            <a:fld id="{68F3185B-C653-42AE-8B74-FF214C291574}" type="slidenum">
+              <a:rPr lang="en-US" smtClean="0"/>
+              <a:pPr/>
+              <a:t>14</a:t>
+            </a:fld>
+            <a:endParaRPr lang="en-US"/>
+          </a:p>
+        </p:txBody>
+      </p:sp>
+      <p:sp>
+        <p:nvSpPr>
+          <p:cNvPr id="6" name="Titel 5">
+            <a:extLst>
+              <a:ext uri="{FF2B5EF4-FFF2-40B4-BE49-F238E27FC236}">
+                <a16:creationId xmlns:a16="http://schemas.microsoft.com/office/drawing/2014/main" id="{ECD1BE86-B780-416C-8EAA-2B4B75B29378}"/>
+              </a:ext>
+            </a:extLst>
+          </p:cNvPr>
+          <p:cNvSpPr>
+            <a:spLocks noGrp="1"/>
+          </p:cNvSpPr>
+          <p:nvPr>
+            <p:ph type="title"/>
+          </p:nvPr>
+        </p:nvSpPr>
+        <p:spPr>
+          <a:xfrm>
+            <a:off x="549322" y="651700"/>
+            <a:ext cx="8594678" cy="938696"/>
+          </a:xfrm>
+        </p:spPr>
+        <p:txBody>
+          <a:bodyPr/>
+          <a:lstStyle/>
+          <a:p>
+            <a:r>
+              <a:rPr lang="de-AT" dirty="0"/>
+              <a:t>Umsetzung Buy-Entscheidung</a:t>
+            </a:r>
+          </a:p>
+        </p:txBody>
+      </p:sp>
+    </p:spTree>
+    <p:extLst>
+      <p:ext uri="{BB962C8B-B14F-4D97-AF65-F5344CB8AC3E}">
+        <p14:creationId xmlns:p14="http://schemas.microsoft.com/office/powerpoint/2010/main" val="2552995678"/>
+      </p:ext>
+    </p:extLst>
+  </p:cSld>
+  <p:clrMapOvr>
+    <a:masterClrMapping/>
+  </p:clrMapOvr>
+</p:sld>
+</file>
+
+<file path=ppt/slides/slide15.xml><?xml version="1.0" encoding="utf-8"?>
+<p:sld xmlns:a="http://schemas.openxmlformats.org/drawingml/2006/main" xmlns:r="http://schemas.openxmlformats.org/officeDocument/2006/relationships" xmlns:p="http://schemas.openxmlformats.org/presentationml/2006/main">
+  <p:cSld>
+    <p:spTree>
+      <p:nvGrpSpPr>
+        <p:cNvPr id="1" name=""/>
+        <p:cNvGrpSpPr/>
+        <p:nvPr/>
+      </p:nvGrpSpPr>
+      <p:grpSpPr>
+        <a:xfrm>
+          <a:off x="0" y="0"/>
+          <a:ext cx="0" cy="0"/>
+          <a:chOff x="0" y="0"/>
+          <a:chExt cx="0" cy="0"/>
+        </a:xfrm>
+      </p:grpSpPr>
+      <p:sp>
+        <p:nvSpPr>
+          <p:cNvPr id="2" name="Textplatzhalter 1">
+            <a:extLst>
+              <a:ext uri="{FF2B5EF4-FFF2-40B4-BE49-F238E27FC236}">
+                <a16:creationId xmlns:a16="http://schemas.microsoft.com/office/drawing/2014/main" id="{62C85FB2-1022-4081-ABAD-803398685F11}"/>
+              </a:ext>
+            </a:extLst>
+          </p:cNvPr>
+          <p:cNvSpPr>
+            <a:spLocks noGrp="1"/>
+          </p:cNvSpPr>
+          <p:nvPr>
+            <p:ph type="body" sz="quarter" idx="13"/>
+          </p:nvPr>
+        </p:nvSpPr>
+        <p:spPr>
+          <a:xfrm>
+            <a:off x="549322" y="1541402"/>
+            <a:ext cx="7938000" cy="938696"/>
+          </a:xfrm>
+        </p:spPr>
+        <p:txBody>
+          <a:bodyPr/>
+          <a:lstStyle/>
+          <a:p>
+            <a:r>
+              <a:rPr lang="de-AT" dirty="0"/>
+              <a:t>Gantt-Diagramm als Projektplan in Microsoft Excel</a:t>
+            </a:r>
+          </a:p>
+        </p:txBody>
+      </p:sp>
+      <p:sp>
+        <p:nvSpPr>
+          <p:cNvPr id="4" name="Fußzeilenplatzhalter 3">
+            <a:extLst>
+              <a:ext uri="{FF2B5EF4-FFF2-40B4-BE49-F238E27FC236}">
+                <a16:creationId xmlns:a16="http://schemas.microsoft.com/office/drawing/2014/main" id="{506052DC-7049-4393-B1C5-754A14BCDAFA}"/>
+              </a:ext>
+            </a:extLst>
+          </p:cNvPr>
+          <p:cNvSpPr>
+            <a:spLocks noGrp="1"/>
+          </p:cNvSpPr>
+          <p:nvPr>
+            <p:ph type="ftr" sz="quarter" idx="16"/>
+          </p:nvPr>
+        </p:nvSpPr>
+        <p:spPr>
+          <a:xfrm>
+            <a:off x="4273550" y="6395540"/>
+            <a:ext cx="3086100" cy="365125"/>
+          </a:xfrm>
+        </p:spPr>
+        <p:txBody>
+          <a:bodyPr/>
+          <a:lstStyle/>
+          <a:p>
+            <a:r>
+              <a:rPr lang="de-AT" noProof="0" dirty="0"/>
+              <a:t>LVA-Nr.: 256.002</a:t>
+            </a:r>
+          </a:p>
+        </p:txBody>
+      </p:sp>
+      <p:sp>
+        <p:nvSpPr>
+          <p:cNvPr id="5" name="Foliennummernplatzhalter 4">
+            <a:extLst>
+              <a:ext uri="{FF2B5EF4-FFF2-40B4-BE49-F238E27FC236}">
+                <a16:creationId xmlns:a16="http://schemas.microsoft.com/office/drawing/2014/main" id="{5BE28071-B805-4E3A-8BBA-20469274180D}"/>
+              </a:ext>
+            </a:extLst>
+          </p:cNvPr>
+          <p:cNvSpPr>
+            <a:spLocks noGrp="1"/>
+          </p:cNvSpPr>
+          <p:nvPr>
+            <p:ph type="sldNum" sz="quarter" idx="17"/>
+          </p:nvPr>
+        </p:nvSpPr>
+        <p:spPr/>
+        <p:txBody>
+          <a:bodyPr/>
+          <a:lstStyle/>
+          <a:p>
+            <a:fld id="{68F3185B-C653-42AE-8B74-FF214C291574}" type="slidenum">
+              <a:rPr lang="en-US" smtClean="0"/>
+              <a:pPr/>
+              <a:t>15</a:t>
+            </a:fld>
+            <a:endParaRPr lang="en-US"/>
+          </a:p>
+        </p:txBody>
+      </p:sp>
+      <p:sp>
+        <p:nvSpPr>
+          <p:cNvPr id="6" name="Titel 5">
+            <a:extLst>
+              <a:ext uri="{FF2B5EF4-FFF2-40B4-BE49-F238E27FC236}">
+                <a16:creationId xmlns:a16="http://schemas.microsoft.com/office/drawing/2014/main" id="{ECD1BE86-B780-416C-8EAA-2B4B75B29378}"/>
+              </a:ext>
+            </a:extLst>
+          </p:cNvPr>
+          <p:cNvSpPr>
+            <a:spLocks noGrp="1"/>
+          </p:cNvSpPr>
+          <p:nvPr>
+            <p:ph type="title"/>
+          </p:nvPr>
+        </p:nvSpPr>
+        <p:spPr/>
+        <p:txBody>
+          <a:bodyPr/>
+          <a:lstStyle/>
+          <a:p>
+            <a:r>
+              <a:rPr lang="de-AT" dirty="0"/>
+              <a:t>Projektplan &amp; Seminararbeit</a:t>
             </a:r>
           </a:p>
         </p:txBody>
@@ -8453,7 +10883,7 @@
 </p:sld>
 </file>
 
-<file path=ppt/slides/slide11.xml><?xml version="1.0" encoding="utf-8"?>
+<file path=ppt/slides/slide16.xml><?xml version="1.0" encoding="utf-8"?>
 <p:sld xmlns:a="http://schemas.openxmlformats.org/drawingml/2006/main" xmlns:r="http://schemas.openxmlformats.org/officeDocument/2006/relationships" xmlns:p="http://schemas.openxmlformats.org/presentationml/2006/main">
   <p:cSld>
     <p:spTree>
@@ -8581,7 +11011,7 @@
             <a:fld id="{68F3185B-C653-42AE-8B74-FF214C291574}" type="slidenum">
               <a:rPr lang="en-US" smtClean="0"/>
               <a:pPr/>
-              <a:t>11</a:t>
+              <a:t>16</a:t>
             </a:fld>
             <a:endParaRPr lang="en-US"/>
           </a:p>
@@ -8628,7 +11058,7 @@
 </p:sld>
 </file>
 
-<file path=ppt/slides/slide12.xml><?xml version="1.0" encoding="utf-8"?>
+<file path=ppt/slides/slide17.xml><?xml version="1.0" encoding="utf-8"?>
 <p:sld xmlns:a="http://schemas.openxmlformats.org/drawingml/2006/main" xmlns:r="http://schemas.openxmlformats.org/officeDocument/2006/relationships" xmlns:p="http://schemas.openxmlformats.org/presentationml/2006/main">
   <p:cSld>
     <p:spTree>
@@ -8677,11 +11107,31 @@
             </a:pPr>
             <a:r>
               <a:rPr lang="de-AT" dirty="0"/>
-              <a:t>Durchführung eines Workshops mit alles Stakeholdern</a:t>
-            </a:r>
-          </a:p>
-          <a:p>
-            <a:pPr marL="285750" indent="-285750">
+              <a:t>Durchführung eines Workshops mit allen Stakeholdern</a:t>
+            </a:r>
+          </a:p>
+          <a:p>
+            <a:pPr marL="552450" lvl="1" indent="-285750">
+              <a:buFont typeface="Arial" panose="020B0604020202020204" pitchFamily="34" charset="0"/>
+              <a:buChar char="•"/>
+            </a:pPr>
+            <a:r>
+              <a:rPr lang="de-AT" dirty="0"/>
+              <a:t>Schärfen &amp; Abgleich unterschiedlicher Anforderungen</a:t>
+            </a:r>
+          </a:p>
+          <a:p>
+            <a:pPr marL="552450" lvl="1" indent="-285750">
+              <a:buFont typeface="Arial" panose="020B0604020202020204" pitchFamily="34" charset="0"/>
+              <a:buChar char="•"/>
+            </a:pPr>
+            <a:r>
+              <a:rPr lang="de-AT" dirty="0"/>
+              <a:t>Terminvereinbarung</a:t>
+            </a:r>
+          </a:p>
+          <a:p>
+            <a:pPr marL="552450" lvl="1" indent="-285750">
               <a:buFont typeface="Arial" panose="020B0604020202020204" pitchFamily="34" charset="0"/>
               <a:buChar char="•"/>
             </a:pPr>
@@ -8797,7 +11247,7 @@
             <a:fld id="{68F3185B-C653-42AE-8B74-FF214C291574}" type="slidenum">
               <a:rPr lang="en-US" smtClean="0"/>
               <a:pPr/>
-              <a:t>12</a:t>
+              <a:t>17</a:t>
             </a:fld>
             <a:endParaRPr lang="en-US"/>
           </a:p>
@@ -8849,7 +11299,7 @@
 </p:sld>
 </file>
 
-<file path=ppt/slides/slide13.xml><?xml version="1.0" encoding="utf-8"?>
+<file path=ppt/slides/slide18.xml><?xml version="1.0" encoding="utf-8"?>
 <p:sld xmlns:a="http://schemas.openxmlformats.org/drawingml/2006/main" xmlns:r="http://schemas.openxmlformats.org/officeDocument/2006/relationships" xmlns:p="http://schemas.openxmlformats.org/presentationml/2006/main">
   <p:cSld>
     <p:spTree>
@@ -8923,7 +11373,7 @@
             <a:fld id="{68F3185B-C653-42AE-8B74-FF214C291574}" type="slidenum">
               <a:rPr lang="en-US" smtClean="0"/>
               <a:pPr/>
-              <a:t>13</a:t>
+              <a:t>18</a:t>
             </a:fld>
             <a:endParaRPr lang="en-US"/>
           </a:p>
@@ -9014,7 +11464,7 @@
 </p:sld>
 </file>
 
-<file path=ppt/slides/slide14.xml><?xml version="1.0" encoding="utf-8"?>
+<file path=ppt/slides/slide19.xml><?xml version="1.0" encoding="utf-8"?>
 <p:sld xmlns:a="http://schemas.openxmlformats.org/drawingml/2006/main" xmlns:r="http://schemas.openxmlformats.org/officeDocument/2006/relationships" xmlns:p="http://schemas.openxmlformats.org/presentationml/2006/main">
   <p:cSld>
     <p:spTree>
@@ -9077,7 +11527,202 @@
 </p:sld>
 </file>
 
-<file path=ppt/slides/slide15.xml><?xml version="1.0" encoding="utf-8"?>
+<file path=ppt/slides/slide2.xml><?xml version="1.0" encoding="utf-8"?>
+<p:sld xmlns:a="http://schemas.openxmlformats.org/drawingml/2006/main" xmlns:r="http://schemas.openxmlformats.org/officeDocument/2006/relationships" xmlns:p="http://schemas.openxmlformats.org/presentationml/2006/main">
+  <p:cSld>
+    <p:spTree>
+      <p:nvGrpSpPr>
+        <p:cNvPr id="1" name=""/>
+        <p:cNvGrpSpPr/>
+        <p:nvPr/>
+      </p:nvGrpSpPr>
+      <p:grpSpPr>
+        <a:xfrm>
+          <a:off x="0" y="0"/>
+          <a:ext cx="0" cy="0"/>
+          <a:chOff x="0" y="0"/>
+          <a:chExt cx="0" cy="0"/>
+        </a:xfrm>
+      </p:grpSpPr>
+      <p:sp>
+        <p:nvSpPr>
+          <p:cNvPr id="2" name="Titel 1">
+            <a:extLst>
+              <a:ext uri="{FF2B5EF4-FFF2-40B4-BE49-F238E27FC236}">
+                <a16:creationId xmlns:a16="http://schemas.microsoft.com/office/drawing/2014/main" id="{9DE4D625-5FAE-49F6-BA0D-66335CF6874E}"/>
+              </a:ext>
+            </a:extLst>
+          </p:cNvPr>
+          <p:cNvSpPr>
+            <a:spLocks noGrp="1"/>
+          </p:cNvSpPr>
+          <p:nvPr>
+            <p:ph type="ctrTitle"/>
+          </p:nvPr>
+        </p:nvSpPr>
+        <p:spPr/>
+        <p:txBody>
+          <a:bodyPr/>
+          <a:lstStyle/>
+          <a:p>
+            <a:r>
+              <a:rPr lang="de-AT" spc="13" dirty="0"/>
+              <a:t>IT-Projekt wirtschafts-informatik</a:t>
+            </a:r>
+            <a:endParaRPr lang="de-AT" dirty="0"/>
+          </a:p>
+        </p:txBody>
+      </p:sp>
+      <p:sp>
+        <p:nvSpPr>
+          <p:cNvPr id="3" name="Untertitel 2">
+            <a:extLst>
+              <a:ext uri="{FF2B5EF4-FFF2-40B4-BE49-F238E27FC236}">
+                <a16:creationId xmlns:a16="http://schemas.microsoft.com/office/drawing/2014/main" id="{60468810-68EE-4DF9-9204-4F8F5437B32A}"/>
+              </a:ext>
+            </a:extLst>
+          </p:cNvPr>
+          <p:cNvSpPr>
+            <a:spLocks noGrp="1"/>
+          </p:cNvSpPr>
+          <p:nvPr>
+            <p:ph type="subTitle" idx="1"/>
+          </p:nvPr>
+        </p:nvSpPr>
+        <p:spPr/>
+        <p:txBody>
+          <a:bodyPr/>
+          <a:lstStyle/>
+          <a:p>
+            <a:endParaRPr lang="de-AT" dirty="0"/>
+          </a:p>
+          <a:p>
+            <a:r>
+              <a:rPr lang="de-AT" dirty="0"/>
+              <a:t>Weitere Lehrende: </a:t>
+            </a:r>
+            <a:r>
+              <a:rPr lang="de-AT" spc="13" dirty="0">
+                <a:solidFill>
+                  <a:prstClr val="black"/>
+                </a:solidFill>
+                <a:cs typeface="Arial"/>
+              </a:rPr>
+              <a:t>David Christoph Rückel, Barbara </a:t>
+            </a:r>
+            <a:r>
+              <a:rPr lang="de-AT" spc="13" dirty="0" err="1">
+                <a:solidFill>
+                  <a:prstClr val="black"/>
+                </a:solidFill>
+                <a:cs typeface="Arial"/>
+              </a:rPr>
+              <a:t>Krumay</a:t>
+            </a:r>
+            <a:endParaRPr lang="de-AT" dirty="0">
+              <a:solidFill>
+                <a:prstClr val="black"/>
+              </a:solidFill>
+              <a:cs typeface="Arial"/>
+            </a:endParaRPr>
+          </a:p>
+          <a:p>
+            <a:endParaRPr lang="de-AT" dirty="0"/>
+          </a:p>
+        </p:txBody>
+      </p:sp>
+      <p:sp>
+        <p:nvSpPr>
+          <p:cNvPr id="5" name="Textplatzhalter 4">
+            <a:extLst>
+              <a:ext uri="{FF2B5EF4-FFF2-40B4-BE49-F238E27FC236}">
+                <a16:creationId xmlns:a16="http://schemas.microsoft.com/office/drawing/2014/main" id="{5106B240-7772-4A44-B281-E73313AC863B}"/>
+              </a:ext>
+            </a:extLst>
+          </p:cNvPr>
+          <p:cNvSpPr>
+            <a:spLocks noGrp="1"/>
+          </p:cNvSpPr>
+          <p:nvPr>
+            <p:ph type="body" sz="quarter" idx="12"/>
+          </p:nvPr>
+        </p:nvSpPr>
+        <p:spPr>
+          <a:xfrm>
+            <a:off x="2181509" y="2623322"/>
+            <a:ext cx="6301462" cy="1130300"/>
+          </a:xfrm>
+        </p:spPr>
+        <p:txBody>
+          <a:bodyPr/>
+          <a:lstStyle/>
+          <a:p>
+            <a:pPr marL="10860" defTabSz="781903">
+              <a:spcBef>
+                <a:spcPts val="111"/>
+              </a:spcBef>
+            </a:pPr>
+            <a:r>
+              <a:rPr lang="de-AT" b="1" spc="9" dirty="0">
+                <a:solidFill>
+                  <a:prstClr val="black"/>
+                </a:solidFill>
+                <a:latin typeface="Arial"/>
+                <a:cs typeface="Arial"/>
+              </a:rPr>
+              <a:t>LVA-Nr.: 256.002</a:t>
+            </a:r>
+          </a:p>
+          <a:p>
+            <a:pPr marL="10860" defTabSz="781903">
+              <a:spcBef>
+                <a:spcPts val="111"/>
+              </a:spcBef>
+            </a:pPr>
+            <a:r>
+              <a:rPr lang="de-AT" b="1" dirty="0">
+                <a:solidFill>
+                  <a:prstClr val="black"/>
+                </a:solidFill>
+                <a:latin typeface="Arial"/>
+                <a:cs typeface="Arial"/>
+              </a:rPr>
+              <a:t>LVA-Leiter</a:t>
+            </a:r>
+            <a:r>
+              <a:rPr lang="de-AT" b="1" spc="9" dirty="0">
+                <a:solidFill>
+                  <a:prstClr val="black"/>
+                </a:solidFill>
+                <a:latin typeface="Arial"/>
+                <a:cs typeface="Arial"/>
+              </a:rPr>
+              <a:t>: Stefan Koch</a:t>
+            </a:r>
+            <a:endParaRPr lang="de-AT" b="1" dirty="0">
+              <a:solidFill>
+                <a:prstClr val="black"/>
+              </a:solidFill>
+              <a:latin typeface="Arial"/>
+              <a:cs typeface="Arial"/>
+            </a:endParaRPr>
+          </a:p>
+        </p:txBody>
+      </p:sp>
+    </p:spTree>
+    <p:extLst>
+      <p:ext uri="{BB962C8B-B14F-4D97-AF65-F5344CB8AC3E}">
+        <p14:creationId xmlns:p14="http://schemas.microsoft.com/office/powerpoint/2010/main" val="157076941"/>
+      </p:ext>
+    </p:extLst>
+  </p:cSld>
+  <p:clrMapOvr>
+    <a:masterClrMapping/>
+  </p:clrMapOvr>
+</p:sld>
+</file>
+
+<file path=ppt/slides/slide20.xml><?xml version="1.0" encoding="utf-8"?>
 <p:sld xmlns:a="http://schemas.openxmlformats.org/drawingml/2006/main" xmlns:r="http://schemas.openxmlformats.org/officeDocument/2006/relationships" xmlns:p="http://schemas.openxmlformats.org/presentationml/2006/main">
   <p:cSld>
     <p:spTree>
@@ -9107,205 +11752,6 @@
 </p:sld>
 </file>
 
-<file path=ppt/slides/slide2.xml><?xml version="1.0" encoding="utf-8"?>
-<p:sld xmlns:a="http://schemas.openxmlformats.org/drawingml/2006/main" xmlns:r="http://schemas.openxmlformats.org/officeDocument/2006/relationships" xmlns:p="http://schemas.openxmlformats.org/presentationml/2006/main">
-  <p:cSld>
-    <p:spTree>
-      <p:nvGrpSpPr>
-        <p:cNvPr id="1" name=""/>
-        <p:cNvGrpSpPr/>
-        <p:nvPr/>
-      </p:nvGrpSpPr>
-      <p:grpSpPr>
-        <a:xfrm>
-          <a:off x="0" y="0"/>
-          <a:ext cx="0" cy="0"/>
-          <a:chOff x="0" y="0"/>
-          <a:chExt cx="0" cy="0"/>
-        </a:xfrm>
-      </p:grpSpPr>
-      <p:sp>
-        <p:nvSpPr>
-          <p:cNvPr id="2" name="Titel 1">
-            <a:extLst>
-              <a:ext uri="{FF2B5EF4-FFF2-40B4-BE49-F238E27FC236}">
-                <a16:creationId xmlns:a16="http://schemas.microsoft.com/office/drawing/2014/main" id="{9DE4D625-5FAE-49F6-BA0D-66335CF6874E}"/>
-              </a:ext>
-            </a:extLst>
-          </p:cNvPr>
-          <p:cNvSpPr>
-            <a:spLocks noGrp="1"/>
-          </p:cNvSpPr>
-          <p:nvPr>
-            <p:ph type="ctrTitle"/>
-          </p:nvPr>
-        </p:nvSpPr>
-        <p:spPr/>
-        <p:txBody>
-          <a:bodyPr/>
-          <a:lstStyle/>
-          <a:p>
-            <a:r>
-              <a:rPr lang="de-AT" spc="13" dirty="0"/>
-              <a:t>IT-Projekt </a:t>
-            </a:r>
-            <a:r>
-              <a:rPr lang="de-AT" spc="13" dirty="0" err="1"/>
-              <a:t>wirtschaftsinfor-matik</a:t>
-            </a:r>
-            <a:endParaRPr lang="de-AT" dirty="0"/>
-          </a:p>
-        </p:txBody>
-      </p:sp>
-      <p:sp>
-        <p:nvSpPr>
-          <p:cNvPr id="3" name="Untertitel 2">
-            <a:extLst>
-              <a:ext uri="{FF2B5EF4-FFF2-40B4-BE49-F238E27FC236}">
-                <a16:creationId xmlns:a16="http://schemas.microsoft.com/office/drawing/2014/main" id="{60468810-68EE-4DF9-9204-4F8F5437B32A}"/>
-              </a:ext>
-            </a:extLst>
-          </p:cNvPr>
-          <p:cNvSpPr>
-            <a:spLocks noGrp="1"/>
-          </p:cNvSpPr>
-          <p:nvPr>
-            <p:ph type="subTitle" idx="1"/>
-          </p:nvPr>
-        </p:nvSpPr>
-        <p:spPr/>
-        <p:txBody>
-          <a:bodyPr/>
-          <a:lstStyle/>
-          <a:p>
-            <a:endParaRPr lang="de-AT" dirty="0"/>
-          </a:p>
-          <a:p>
-            <a:r>
-              <a:rPr lang="de-AT" dirty="0"/>
-              <a:t>Weitere Lehrende: </a:t>
-            </a:r>
-            <a:r>
-              <a:rPr lang="de-AT" spc="13" dirty="0">
-                <a:solidFill>
-                  <a:prstClr val="black"/>
-                </a:solidFill>
-                <a:cs typeface="Arial"/>
-              </a:rPr>
-              <a:t>David Christoph Rückel, Barbara </a:t>
-            </a:r>
-            <a:r>
-              <a:rPr lang="de-AT" spc="13" dirty="0" err="1">
-                <a:solidFill>
-                  <a:prstClr val="black"/>
-                </a:solidFill>
-                <a:cs typeface="Arial"/>
-              </a:rPr>
-              <a:t>Krumay</a:t>
-            </a:r>
-            <a:endParaRPr lang="de-AT" dirty="0">
-              <a:solidFill>
-                <a:prstClr val="black"/>
-              </a:solidFill>
-              <a:cs typeface="Arial"/>
-            </a:endParaRPr>
-          </a:p>
-          <a:p>
-            <a:endParaRPr lang="de-AT" dirty="0"/>
-          </a:p>
-        </p:txBody>
-      </p:sp>
-      <p:sp>
-        <p:nvSpPr>
-          <p:cNvPr id="5" name="Textplatzhalter 4">
-            <a:extLst>
-              <a:ext uri="{FF2B5EF4-FFF2-40B4-BE49-F238E27FC236}">
-                <a16:creationId xmlns:a16="http://schemas.microsoft.com/office/drawing/2014/main" id="{5106B240-7772-4A44-B281-E73313AC863B}"/>
-              </a:ext>
-            </a:extLst>
-          </p:cNvPr>
-          <p:cNvSpPr>
-            <a:spLocks noGrp="1"/>
-          </p:cNvSpPr>
-          <p:nvPr>
-            <p:ph type="body" sz="quarter" idx="12"/>
-          </p:nvPr>
-        </p:nvSpPr>
-        <p:spPr>
-          <a:xfrm>
-            <a:off x="2181509" y="2623322"/>
-            <a:ext cx="6301462" cy="1130300"/>
-          </a:xfrm>
-        </p:spPr>
-        <p:txBody>
-          <a:bodyPr/>
-          <a:lstStyle/>
-          <a:p>
-            <a:pPr marL="10860" defTabSz="781903">
-              <a:spcBef>
-                <a:spcPts val="111"/>
-              </a:spcBef>
-            </a:pPr>
-            <a:r>
-              <a:rPr lang="de-AT" b="1" spc="9" dirty="0">
-                <a:solidFill>
-                  <a:prstClr val="black"/>
-                </a:solidFill>
-                <a:latin typeface="Arial"/>
-                <a:cs typeface="Arial"/>
-              </a:rPr>
-              <a:t>LVA-Nr.: 256.002</a:t>
-            </a:r>
-          </a:p>
-          <a:p>
-            <a:pPr marL="10860" defTabSz="781903">
-              <a:spcBef>
-                <a:spcPts val="111"/>
-              </a:spcBef>
-            </a:pPr>
-            <a:r>
-              <a:rPr lang="de-AT" b="1" dirty="0">
-                <a:solidFill>
-                  <a:prstClr val="black"/>
-                </a:solidFill>
-                <a:latin typeface="Arial"/>
-                <a:cs typeface="Arial"/>
-              </a:rPr>
-              <a:t>LVA-Leiter</a:t>
-            </a:r>
-            <a:r>
-              <a:rPr lang="de-AT" b="1" spc="9" dirty="0">
-                <a:solidFill>
-                  <a:prstClr val="black"/>
-                </a:solidFill>
-                <a:latin typeface="Arial"/>
-                <a:cs typeface="Arial"/>
-              </a:rPr>
-              <a:t>: Stefan Koch</a:t>
-            </a:r>
-            <a:endParaRPr lang="de-AT" b="1" dirty="0">
-              <a:solidFill>
-                <a:prstClr val="black"/>
-              </a:solidFill>
-              <a:latin typeface="Arial"/>
-              <a:cs typeface="Arial"/>
-            </a:endParaRPr>
-          </a:p>
-        </p:txBody>
-      </p:sp>
-    </p:spTree>
-    <p:extLst>
-      <p:ext uri="{BB962C8B-B14F-4D97-AF65-F5344CB8AC3E}">
-        <p14:creationId xmlns:p14="http://schemas.microsoft.com/office/powerpoint/2010/main" val="157076941"/>
-      </p:ext>
-    </p:extLst>
-  </p:cSld>
-  <p:clrMapOvr>
-    <a:masterClrMapping/>
-  </p:clrMapOvr>
-</p:sld>
-</file>
-
 <file path=ppt/slides/slide3.xml><?xml version="1.0" encoding="utf-8"?>
 <p:sld xmlns:a="http://schemas.openxmlformats.org/drawingml/2006/main" xmlns:r="http://schemas.openxmlformats.org/officeDocument/2006/relationships" xmlns:p="http://schemas.openxmlformats.org/presentationml/2006/main">
   <p:cSld>
@@ -9376,15 +11822,7 @@
             </a:r>
             <a:r>
               <a:rPr lang="de-AT" sz="1800" dirty="0"/>
-              <a:t> </a:t>
-            </a:r>
-            <a:r>
-              <a:rPr lang="de-AT" sz="1800" dirty="0" err="1"/>
-              <a:t>Buy</a:t>
-            </a:r>
-            <a:r>
-              <a:rPr lang="de-AT" sz="1800" dirty="0"/>
-              <a:t> (</a:t>
+              <a:t> Buy (</a:t>
             </a:r>
             <a:r>
               <a:rPr lang="de-AT" sz="1800" dirty="0" err="1"/>
@@ -9398,7 +11836,7 @@
           <a:p>
             <a:r>
               <a:rPr lang="de-AT" sz="1800" dirty="0"/>
-              <a:t>Entwicklung von Szenarien je Entscheidung</a:t>
+              <a:t>Entwicklung von Szenarien für Planung der Umsetzung</a:t>
             </a:r>
           </a:p>
           <a:p>
@@ -9410,7 +11848,7 @@
           <a:p>
             <a:r>
               <a:rPr lang="de-AT" sz="1800" dirty="0"/>
-              <a:t>Aktuelle Stand der Seminararbeit </a:t>
+              <a:t>Aktueller Stand der Seminararbeit </a:t>
             </a:r>
           </a:p>
           <a:p>
@@ -9598,7 +12036,7 @@
             </a:pPr>
             <a:r>
               <a:rPr lang="de-AT" sz="1800" dirty="0"/>
-              <a:t>Allgemeine Funktionalitäten</a:t>
+              <a:t>Horizontal: Zu befragende Stakeholder</a:t>
             </a:r>
           </a:p>
           <a:p>
@@ -9611,99 +12049,11 @@
             </a:pPr>
             <a:r>
               <a:rPr lang="de-AT" sz="1800" dirty="0"/>
-              <a:t>Designeinschränkungen</a:t>
+              <a:t>Vertikal: Zu stellende Fragen (Allgemein &amp; Spezifisch)</a:t>
             </a:r>
           </a:p>
           <a:p>
             <a:endParaRPr lang="de-AT" sz="1800" dirty="0"/>
-          </a:p>
-          <a:p>
-            <a:pPr marL="285750" indent="-285750">
-              <a:buFont typeface="Arial" panose="020B0604020202020204" pitchFamily="34" charset="0"/>
-              <a:buChar char="•"/>
-            </a:pPr>
-            <a:r>
-              <a:rPr lang="de-AT" sz="1800" dirty="0"/>
-              <a:t>Benutzereigenschaften</a:t>
-            </a:r>
-          </a:p>
-          <a:p>
-            <a:pPr marL="552450" lvl="1" indent="-285750">
-              <a:buFont typeface="Arial" panose="020B0604020202020204" pitchFamily="34" charset="0"/>
-              <a:buChar char="•"/>
-            </a:pPr>
-            <a:r>
-              <a:rPr lang="de-AT" sz="1600" dirty="0"/>
-              <a:t>Spezifische Anforderungen</a:t>
-            </a:r>
-          </a:p>
-          <a:p>
-            <a:pPr marL="1221750" lvl="2" indent="-285750">
-              <a:buFont typeface="Arial" panose="020B0604020202020204" pitchFamily="34" charset="0"/>
-              <a:buChar char="•"/>
-            </a:pPr>
-            <a:r>
-              <a:rPr lang="de-AT" sz="1700" dirty="0"/>
-              <a:t>„</a:t>
-            </a:r>
-            <a:r>
-              <a:rPr lang="de-AT" sz="1700" dirty="0" err="1"/>
-              <a:t>need</a:t>
-            </a:r>
-            <a:r>
-              <a:rPr lang="de-AT" sz="1700" dirty="0"/>
-              <a:t> </a:t>
-            </a:r>
-            <a:r>
-              <a:rPr lang="de-AT" sz="1700" dirty="0" err="1"/>
-              <a:t>to</a:t>
-            </a:r>
-            <a:r>
-              <a:rPr lang="de-AT" sz="1700" dirty="0"/>
-              <a:t> </a:t>
-            </a:r>
-            <a:r>
-              <a:rPr lang="de-AT" sz="1700" dirty="0" err="1"/>
-              <a:t>have</a:t>
-            </a:r>
-            <a:r>
-              <a:rPr lang="de-AT" sz="1700" dirty="0"/>
-              <a:t>“</a:t>
-            </a:r>
-          </a:p>
-          <a:p>
-            <a:pPr marL="1221750" lvl="2" indent="-285750">
-              <a:buFont typeface="Arial" panose="020B0604020202020204" pitchFamily="34" charset="0"/>
-              <a:buChar char="•"/>
-            </a:pPr>
-            <a:r>
-              <a:rPr lang="de-AT" sz="1700" dirty="0"/>
-              <a:t>“</a:t>
-            </a:r>
-            <a:r>
-              <a:rPr lang="de-AT" sz="1700" dirty="0" err="1"/>
-              <a:t>nice</a:t>
-            </a:r>
-            <a:r>
-              <a:rPr lang="de-AT" sz="1700" dirty="0"/>
-              <a:t> </a:t>
-            </a:r>
-            <a:r>
-              <a:rPr lang="de-AT" sz="1700" dirty="0" err="1"/>
-              <a:t>to</a:t>
-            </a:r>
-            <a:r>
-              <a:rPr lang="de-AT" sz="1700" dirty="0"/>
-              <a:t> </a:t>
-            </a:r>
-            <a:r>
-              <a:rPr lang="de-AT" sz="1700" dirty="0" err="1"/>
-              <a:t>have</a:t>
-            </a:r>
-            <a:r>
-              <a:rPr lang="de-AT" sz="1700" dirty="0"/>
-              <a:t>“</a:t>
-            </a:r>
           </a:p>
           <a:p>
             <a:endParaRPr lang="de-AT" sz="1800" dirty="0"/>
@@ -9804,15 +12154,45 @@
           <a:p>
             <a:r>
               <a:rPr lang="de-AT" dirty="0"/>
-              <a:t>Anforderungserhebung</a:t>
-            </a:r>
-          </a:p>
-        </p:txBody>
-      </p:sp>
+              <a:t>Anforderungskatalog</a:t>
+            </a:r>
+          </a:p>
+        </p:txBody>
+      </p:sp>
+      <p:pic>
+        <p:nvPicPr>
+          <p:cNvPr id="3" name="Grafik 2">
+            <a:extLst>
+              <a:ext uri="{FF2B5EF4-FFF2-40B4-BE49-F238E27FC236}">
+                <a16:creationId xmlns:a16="http://schemas.microsoft.com/office/drawing/2014/main" id="{87F7BF88-B6AA-4162-BF1A-941ED92DC49F}"/>
+              </a:ext>
+            </a:extLst>
+          </p:cNvPr>
+          <p:cNvPicPr>
+            <a:picLocks noChangeAspect="1"/>
+          </p:cNvPicPr>
+          <p:nvPr/>
+        </p:nvPicPr>
+        <p:blipFill>
+          <a:blip r:embed="rId3"/>
+          <a:stretch>
+            <a:fillRect/>
+          </a:stretch>
+        </p:blipFill>
+        <p:spPr>
+          <a:xfrm>
+            <a:off x="448573" y="3336069"/>
+            <a:ext cx="8246853" cy="2844602"/>
+          </a:xfrm>
+          <a:prstGeom prst="rect">
+            <a:avLst/>
+          </a:prstGeom>
+        </p:spPr>
+      </p:pic>
     </p:spTree>
     <p:extLst>
       <p:ext uri="{BB962C8B-B14F-4D97-AF65-F5344CB8AC3E}">
-        <p14:creationId xmlns:p14="http://schemas.microsoft.com/office/powerpoint/2010/main" val="3918111414"/>
+        <p14:creationId xmlns:p14="http://schemas.microsoft.com/office/powerpoint/2010/main" val="3757940609"/>
       </p:ext>
     </p:extLst>
   </p:cSld>
@@ -9857,7 +12237,7 @@
         </p:nvSpPr>
         <p:spPr>
           <a:xfrm>
-            <a:off x="549322" y="1373799"/>
+            <a:off x="549322" y="1541402"/>
             <a:ext cx="7938000" cy="4424400"/>
           </a:xfrm>
         </p:spPr>
@@ -9865,13 +12245,113 @@
           <a:bodyPr/>
           <a:lstStyle/>
           <a:p>
-            <a:endParaRPr lang="de-AT" dirty="0"/>
-          </a:p>
-          <a:p>
-            <a:endParaRPr lang="de-AT" dirty="0"/>
-          </a:p>
-          <a:p>
-            <a:endParaRPr lang="de-AT" dirty="0"/>
+            <a:r>
+              <a:rPr lang="de-AT" sz="1800" dirty="0"/>
+              <a:t>Unterteilung erhobener Erkenntnisse in</a:t>
+            </a:r>
+          </a:p>
+          <a:p>
+            <a:pPr marL="285750" indent="-285750">
+              <a:buFont typeface="Arial" panose="020B0604020202020204" pitchFamily="34" charset="0"/>
+              <a:buChar char="•"/>
+            </a:pPr>
+            <a:endParaRPr lang="de-AT" sz="1800" dirty="0"/>
+          </a:p>
+          <a:p>
+            <a:pPr marL="285750" indent="-285750">
+              <a:buFont typeface="Arial" panose="020B0604020202020204" pitchFamily="34" charset="0"/>
+              <a:buChar char="•"/>
+            </a:pPr>
+            <a:r>
+              <a:rPr lang="de-AT" sz="1800" dirty="0"/>
+              <a:t>Allgemeine Funktionalitäten</a:t>
+            </a:r>
+          </a:p>
+          <a:p>
+            <a:endParaRPr lang="de-AT" sz="1800" dirty="0"/>
+          </a:p>
+          <a:p>
+            <a:pPr marL="285750" indent="-285750">
+              <a:buFont typeface="Arial" panose="020B0604020202020204" pitchFamily="34" charset="0"/>
+              <a:buChar char="•"/>
+            </a:pPr>
+            <a:r>
+              <a:rPr lang="de-AT" sz="1800" dirty="0"/>
+              <a:t>Designeinschränkungen</a:t>
+            </a:r>
+          </a:p>
+          <a:p>
+            <a:endParaRPr lang="de-AT" sz="1800" dirty="0"/>
+          </a:p>
+          <a:p>
+            <a:pPr marL="285750" indent="-285750">
+              <a:buFont typeface="Arial" panose="020B0604020202020204" pitchFamily="34" charset="0"/>
+              <a:buChar char="•"/>
+            </a:pPr>
+            <a:r>
+              <a:rPr lang="de-AT" sz="1800" dirty="0"/>
+              <a:t>Benutzereigenschaften</a:t>
+            </a:r>
+          </a:p>
+          <a:p>
+            <a:pPr marL="552450" lvl="1" indent="-285750">
+              <a:buFont typeface="Arial" panose="020B0604020202020204" pitchFamily="34" charset="0"/>
+              <a:buChar char="•"/>
+            </a:pPr>
+            <a:r>
+              <a:rPr lang="de-AT" sz="1600" dirty="0"/>
+              <a:t>Spezifische Anforderungen</a:t>
+            </a:r>
+          </a:p>
+          <a:p>
+            <a:pPr marL="1221750" lvl="2" indent="-285750">
+              <a:buFont typeface="Arial" panose="020B0604020202020204" pitchFamily="34" charset="0"/>
+              <a:buChar char="•"/>
+            </a:pPr>
+            <a:r>
+              <a:rPr lang="de-AT" sz="1700" dirty="0"/>
+              <a:t>„</a:t>
+            </a:r>
+            <a:r>
+              <a:rPr lang="de-AT" sz="1700" dirty="0" err="1"/>
+              <a:t>need</a:t>
+            </a:r>
+            <a:r>
+              <a:rPr lang="de-AT" sz="1700" dirty="0"/>
+              <a:t>-to-</a:t>
+            </a:r>
+            <a:r>
+              <a:rPr lang="de-AT" sz="1700" dirty="0" err="1"/>
+              <a:t>have</a:t>
+            </a:r>
+            <a:r>
+              <a:rPr lang="de-AT" sz="1700" dirty="0"/>
+              <a:t>“</a:t>
+            </a:r>
+          </a:p>
+          <a:p>
+            <a:pPr marL="1221750" lvl="2" indent="-285750">
+              <a:buFont typeface="Arial" panose="020B0604020202020204" pitchFamily="34" charset="0"/>
+              <a:buChar char="•"/>
+            </a:pPr>
+            <a:r>
+              <a:rPr lang="de-AT" sz="1700" dirty="0"/>
+              <a:t>“nice-to-</a:t>
+            </a:r>
+            <a:r>
+              <a:rPr lang="de-AT" sz="1700" dirty="0" err="1"/>
+              <a:t>have</a:t>
+            </a:r>
+            <a:r>
+              <a:rPr lang="de-AT" sz="1700" dirty="0"/>
+              <a:t>“</a:t>
+            </a:r>
+          </a:p>
+          <a:p>
+            <a:endParaRPr lang="de-AT" sz="1800" dirty="0"/>
+          </a:p>
+          <a:p>
+            <a:endParaRPr lang="de-AT" sz="1800" dirty="0"/>
           </a:p>
         </p:txBody>
       </p:sp>
@@ -9956,7 +12436,7 @@
         </p:nvSpPr>
         <p:spPr>
           <a:xfrm>
-            <a:off x="549322" y="590453"/>
+            <a:off x="549128" y="387837"/>
             <a:ext cx="7938194" cy="938696"/>
           </a:xfrm>
         </p:spPr>
@@ -9965,40 +12445,8 @@
           <a:lstStyle/>
           <a:p>
             <a:r>
-              <a:rPr lang="de-AT" sz="3200" dirty="0"/>
-              <a:t>Vorschlag </a:t>
-            </a:r>
-            <a:r>
-              <a:rPr lang="de-AT" sz="3200" dirty="0" err="1"/>
-              <a:t>Make</a:t>
-            </a:r>
-            <a:r>
-              <a:rPr lang="de-AT" sz="3200" dirty="0"/>
-              <a:t> </a:t>
-            </a:r>
-            <a:r>
-              <a:rPr lang="de-AT" sz="3200" dirty="0" err="1"/>
-              <a:t>or</a:t>
-            </a:r>
-            <a:r>
-              <a:rPr lang="de-AT" sz="3200" dirty="0"/>
-              <a:t> </a:t>
-            </a:r>
-            <a:r>
-              <a:rPr lang="de-AT" sz="3200" dirty="0" err="1"/>
-              <a:t>Buy</a:t>
-            </a:r>
-            <a:r>
-              <a:rPr lang="de-AT" sz="3200" dirty="0"/>
-              <a:t> (</a:t>
-            </a:r>
-            <a:r>
-              <a:rPr lang="de-AT" sz="3200" dirty="0" err="1"/>
-              <a:t>use</a:t>
-            </a:r>
-            <a:r>
-              <a:rPr lang="de-AT" sz="3200" dirty="0"/>
-              <a:t>) inkl. Begründung</a:t>
+              <a:rPr lang="de-AT" dirty="0"/>
+              <a:t>Anforderungserhebung</a:t>
             </a:r>
           </a:p>
         </p:txBody>
@@ -10006,7 +12454,7 @@
     </p:spTree>
     <p:extLst>
       <p:ext uri="{BB962C8B-B14F-4D97-AF65-F5344CB8AC3E}">
-        <p14:creationId xmlns:p14="http://schemas.microsoft.com/office/powerpoint/2010/main" val="1325382374"/>
+        <p14:creationId xmlns:p14="http://schemas.microsoft.com/office/powerpoint/2010/main" val="3918111414"/>
       </p:ext>
     </p:extLst>
   </p:cSld>
@@ -10079,25 +12527,8 @@
             </a:r>
             <a:r>
               <a:rPr lang="de-DE" sz="1800" dirty="0"/>
-              <a:t> </a:t>
-            </a:r>
-            <a:r>
-              <a:rPr lang="de-DE" sz="1800" dirty="0" err="1"/>
-              <a:t>Buy</a:t>
-            </a:r>
-            <a:r>
-              <a:rPr lang="de-DE" sz="1800" dirty="0"/>
-              <a:t> (</a:t>
-            </a:r>
-            <a:r>
-              <a:rPr lang="de-DE" sz="1800" dirty="0" err="1"/>
-              <a:t>Use</a:t>
-            </a:r>
-            <a:r>
-              <a:rPr lang="de-DE" sz="1800" dirty="0"/>
-              <a:t>)</a:t>
-            </a:r>
-            <a:endParaRPr lang="de-DE" sz="2400" dirty="0"/>
+              <a:t> Buy Entscheidung</a:t>
+            </a:r>
           </a:p>
           <a:p>
             <a:r>
@@ -10132,7 +12563,7 @@
             </a:pPr>
             <a:r>
               <a:rPr lang="de-DE" sz="1800" dirty="0"/>
-              <a:t>Dauer der Implementierung/Erweiterung</a:t>
+              <a:t>Dauer der Implementierung / Erweiterung</a:t>
             </a:r>
           </a:p>
           <a:p>
@@ -10243,7 +12674,7 @@
           <a:p>
             <a:r>
               <a:rPr lang="de-AT" sz="3200" dirty="0"/>
-              <a:t>Entwicklung von Szenarien je Entscheidung</a:t>
+              <a:t>Entscheidungsrelevante Faktoren</a:t>
             </a:r>
             <a:br>
               <a:rPr lang="de-AT" sz="3200" dirty="0"/>
@@ -10255,7 +12686,7 @@
     </p:spTree>
     <p:extLst>
       <p:ext uri="{BB962C8B-B14F-4D97-AF65-F5344CB8AC3E}">
-        <p14:creationId xmlns:p14="http://schemas.microsoft.com/office/powerpoint/2010/main" val="3896224588"/>
+        <p14:creationId xmlns:p14="http://schemas.microsoft.com/office/powerpoint/2010/main" val="3047389"/>
       </p:ext>
     </p:extLst>
   </p:cSld>
@@ -10300,13 +12731,16 @@
         </p:nvSpPr>
         <p:spPr>
           <a:xfrm>
-            <a:off x="549322" y="1713679"/>
+            <a:off x="549322" y="1541402"/>
             <a:ext cx="7938000" cy="4424400"/>
           </a:xfrm>
         </p:spPr>
         <p:txBody>
           <a:bodyPr/>
           <a:lstStyle/>
+          <a:p>
+            <a:endParaRPr lang="de-AT" dirty="0"/>
+          </a:p>
           <a:p>
             <a:r>
               <a:rPr lang="de-AT" dirty="0"/>
@@ -10319,8 +12753,8 @@
               <a:buChar char="•"/>
             </a:pPr>
             <a:r>
-              <a:rPr lang="de-DE" dirty="0"/>
-              <a:t>Schnelle Recherche durch Nachforschen ob möglich oder nicht</a:t>
+              <a:rPr lang="de-AT" dirty="0"/>
+              <a:t>Aktuelles System ist im Source Code erweiterbar </a:t>
             </a:r>
           </a:p>
           <a:p>
@@ -10329,8 +12763,8 @@
               <a:buChar char="•"/>
             </a:pPr>
             <a:r>
-              <a:rPr lang="de-DE" dirty="0"/>
-              <a:t>Filtern nach Open Source Systemen</a:t>
+              <a:rPr lang="de-AT" dirty="0"/>
+              <a:t>Mängel bereits identifiziert</a:t>
             </a:r>
           </a:p>
           <a:p>
@@ -10338,12 +12772,9 @@
               <a:buFont typeface="Arial" panose="020B0604020202020204" pitchFamily="34" charset="0"/>
               <a:buChar char="•"/>
             </a:pPr>
-            <a:endParaRPr lang="de-DE" dirty="0"/>
-          </a:p>
-          <a:p>
-            <a:r>
-              <a:rPr lang="de-DE" dirty="0"/>
-              <a:t>Nachteile:</a:t>
+            <a:r>
+              <a:rPr lang="de-AT" dirty="0"/>
+              <a:t>Anleitungen in Foren vorhanden</a:t>
             </a:r>
           </a:p>
           <a:p>
@@ -10351,9 +12782,12 @@
               <a:buFont typeface="Arial" panose="020B0604020202020204" pitchFamily="34" charset="0"/>
               <a:buChar char="•"/>
             </a:pPr>
-            <a:r>
-              <a:rPr lang="de-DE" dirty="0"/>
-              <a:t>System wird von Stakeholdern nicht angenommen</a:t>
+            <a:endParaRPr lang="de-AT" dirty="0"/>
+          </a:p>
+          <a:p>
+            <a:r>
+              <a:rPr lang="de-AT" dirty="0"/>
+              <a:t>Nachteile:</a:t>
             </a:r>
           </a:p>
           <a:p>
@@ -10362,8 +12796,16 @@
               <a:buChar char="•"/>
             </a:pPr>
             <a:r>
-              <a:rPr lang="de-DE" dirty="0"/>
-              <a:t>Einarbeitungszeit</a:t>
+              <a:rPr lang="de-AT" dirty="0"/>
+              <a:t>Geringe Anpassungen hinsichtlich nice-to-</a:t>
+            </a:r>
+            <a:r>
+              <a:rPr lang="de-AT" dirty="0" err="1"/>
+              <a:t>have</a:t>
+            </a:r>
+            <a:r>
+              <a:rPr lang="de-AT" dirty="0"/>
+              <a:t> Anforderungen</a:t>
             </a:r>
           </a:p>
           <a:p>
@@ -10372,8 +12814,8 @@
               <a:buChar char="•"/>
             </a:pPr>
             <a:r>
-              <a:rPr lang="de-DE" dirty="0"/>
-              <a:t>Nicht im Zeitrahmen umsetzbar</a:t>
+              <a:rPr lang="de-AT" dirty="0"/>
+              <a:t>Zahlreiche Trial &amp; Error Versuche</a:t>
             </a:r>
           </a:p>
           <a:p>
@@ -10382,24 +12824,11 @@
               <a:buChar char="•"/>
             </a:pPr>
             <a:r>
-              <a:rPr lang="de-DE" dirty="0"/>
-              <a:t>Auswirkung der Erweiterung auf bestehende </a:t>
-            </a:r>
-            <a:r>
-              <a:rPr lang="de-DE" dirty="0" err="1"/>
-              <a:t>Fkt</a:t>
-            </a:r>
-            <a:r>
-              <a:rPr lang="de-DE" dirty="0"/>
-              <a:t>.</a:t>
-            </a:r>
-            <a:endParaRPr lang="de-AT" dirty="0"/>
-          </a:p>
-          <a:p>
-            <a:pPr marL="285750" indent="-285750">
-              <a:buFont typeface="Arial" panose="020B0604020202020204" pitchFamily="34" charset="0"/>
-              <a:buChar char="•"/>
-            </a:pPr>
+              <a:rPr lang="de-AT" dirty="0"/>
+              <a:t>Einarbeitungsphase in Source Code</a:t>
+            </a:r>
+          </a:p>
+          <a:p>
             <a:endParaRPr lang="de-AT" dirty="0"/>
           </a:p>
         </p:txBody>
@@ -10485,8 +12914,8 @@
         </p:nvSpPr>
         <p:spPr>
           <a:xfrm>
-            <a:off x="549322" y="651700"/>
-            <a:ext cx="8594678" cy="938696"/>
+            <a:off x="656678" y="555812"/>
+            <a:ext cx="7830838" cy="1034584"/>
           </a:xfrm>
         </p:spPr>
         <p:txBody>
@@ -10494,10 +12923,6 @@
           <a:lstStyle/>
           <a:p>
             <a:r>
-              <a:rPr lang="de-AT" dirty="0"/>
-              <a:t>Szenarien bei </a:t>
-            </a:r>
-            <a:r>
               <a:rPr lang="de-AT" dirty="0" err="1"/>
               <a:t>Make</a:t>
             </a:r>
@@ -10505,13 +12930,24 @@
               <a:rPr lang="de-AT" dirty="0"/>
               <a:t>-entscheidung</a:t>
             </a:r>
+            <a:br>
+              <a:rPr lang="de-AT" dirty="0"/>
+            </a:br>
+            <a:br>
+              <a:rPr lang="de-AT" dirty="0"/>
+            </a:br>
+            <a:r>
+              <a:rPr lang="de-AT" sz="2000" dirty="0"/>
+              <a:t>Anpassen der bestehenden CRM-Lösung</a:t>
+            </a:r>
+            <a:endParaRPr lang="de-AT" dirty="0"/>
           </a:p>
         </p:txBody>
       </p:sp>
     </p:spTree>
     <p:extLst>
       <p:ext uri="{BB962C8B-B14F-4D97-AF65-F5344CB8AC3E}">
-        <p14:creationId xmlns:p14="http://schemas.microsoft.com/office/powerpoint/2010/main" val="2396075538"/>
+        <p14:creationId xmlns:p14="http://schemas.microsoft.com/office/powerpoint/2010/main" val="80513755"/>
       </p:ext>
     </p:extLst>
   </p:cSld>
@@ -10556,8 +12992,8 @@
         </p:nvSpPr>
         <p:spPr>
           <a:xfrm>
-            <a:off x="549322" y="1541402"/>
-            <a:ext cx="7938000" cy="4424400"/>
+            <a:off x="549322" y="1380226"/>
+            <a:ext cx="7938000" cy="4757853"/>
           </a:xfrm>
         </p:spPr>
         <p:txBody>
@@ -10578,8 +13014,16 @@
               <a:buChar char="•"/>
             </a:pPr>
             <a:r>
-              <a:rPr lang="de-AT" dirty="0"/>
-              <a:t>Jetziges System ist erweiterbar </a:t>
+              <a:rPr lang="de-DE" dirty="0"/>
+              <a:t>Umsetzen funktionaler Anforderungen (</a:t>
+            </a:r>
+            <a:r>
+              <a:rPr lang="de-DE" dirty="0" err="1"/>
+              <a:t>need-to-have</a:t>
+            </a:r>
+            <a:r>
+              <a:rPr lang="de-DE" dirty="0"/>
+              <a:t>)</a:t>
             </a:r>
           </a:p>
           <a:p>
@@ -10588,8 +13032,24 @@
               <a:buChar char="•"/>
             </a:pPr>
             <a:r>
-              <a:rPr lang="de-AT" dirty="0"/>
-              <a:t>Genaues Wissen, was noch fehlt</a:t>
+              <a:rPr lang="de-DE" dirty="0"/>
+              <a:t>Inklusive nice-</a:t>
+            </a:r>
+            <a:r>
+              <a:rPr lang="de-DE" dirty="0" err="1"/>
+              <a:t>to</a:t>
+            </a:r>
+            <a:r>
+              <a:rPr lang="de-DE" dirty="0"/>
+              <a:t>-</a:t>
+            </a:r>
+            <a:r>
+              <a:rPr lang="de-DE" dirty="0" err="1"/>
+              <a:t>have</a:t>
+            </a:r>
+            <a:r>
+              <a:rPr lang="de-DE" dirty="0"/>
+              <a:t> Funktionalitäten</a:t>
             </a:r>
           </a:p>
           <a:p>
@@ -10597,12 +13057,9 @@
               <a:buFont typeface="Arial" panose="020B0604020202020204" pitchFamily="34" charset="0"/>
               <a:buChar char="•"/>
             </a:pPr>
-            <a:endParaRPr lang="de-AT" dirty="0"/>
-          </a:p>
-          <a:p>
-            <a:r>
-              <a:rPr lang="de-AT" dirty="0"/>
-              <a:t>Nachteile:</a:t>
+            <a:r>
+              <a:rPr lang="de-DE" dirty="0"/>
+              <a:t>Erweiterbares Open Source System</a:t>
             </a:r>
           </a:p>
           <a:p>
@@ -10610,9 +13067,12 @@
               <a:buFont typeface="Arial" panose="020B0604020202020204" pitchFamily="34" charset="0"/>
               <a:buChar char="•"/>
             </a:pPr>
-            <a:r>
-              <a:rPr lang="de-AT" dirty="0"/>
-              <a:t>Nicht vieles verändert sich</a:t>
+            <a:endParaRPr lang="de-DE" dirty="0"/>
+          </a:p>
+          <a:p>
+            <a:r>
+              <a:rPr lang="de-DE" dirty="0"/>
+              <a:t>Nachteile:</a:t>
             </a:r>
           </a:p>
           <a:p>
@@ -10621,11 +13081,36 @@
               <a:buChar char="•"/>
             </a:pPr>
             <a:r>
-              <a:rPr lang="de-AT" dirty="0"/>
-              <a:t>Keine Verbesserung im Vergleich bevor es umgeändert wurde</a:t>
-            </a:r>
-          </a:p>
-          <a:p>
+              <a:rPr lang="de-DE" dirty="0"/>
+              <a:t>System wird von Stakeholdern nicht angenommen</a:t>
+            </a:r>
+          </a:p>
+          <a:p>
+            <a:pPr marL="285750" indent="-285750">
+              <a:buFont typeface="Arial" panose="020B0604020202020204" pitchFamily="34" charset="0"/>
+              <a:buChar char="•"/>
+            </a:pPr>
+            <a:r>
+              <a:rPr lang="de-DE" dirty="0"/>
+              <a:t>Auswirkung der Erweiterung auf bestehende Funktionalitäten</a:t>
+            </a:r>
+          </a:p>
+          <a:p>
+            <a:pPr marL="285750" indent="-285750">
+              <a:buFont typeface="Arial" panose="020B0604020202020204" pitchFamily="34" charset="0"/>
+              <a:buChar char="•"/>
+            </a:pPr>
+            <a:r>
+              <a:rPr lang="de-DE" dirty="0"/>
+              <a:t>Einarbeitungs- &amp; Einschulungsaufwand</a:t>
+            </a:r>
+            <a:endParaRPr lang="de-AT" dirty="0"/>
+          </a:p>
+          <a:p>
+            <a:pPr marL="285750" indent="-285750">
+              <a:buFont typeface="Arial" panose="020B0604020202020204" pitchFamily="34" charset="0"/>
+              <a:buChar char="•"/>
+            </a:pPr>
             <a:endParaRPr lang="de-AT" dirty="0"/>
           </a:p>
         </p:txBody>
@@ -10711,8 +13196,8 @@
         </p:nvSpPr>
         <p:spPr>
           <a:xfrm>
-            <a:off x="656678" y="555812"/>
-            <a:ext cx="7830838" cy="1034584"/>
+            <a:off x="549322" y="651700"/>
+            <a:ext cx="8594678" cy="938696"/>
           </a:xfrm>
         </p:spPr>
         <p:txBody>
@@ -10721,31 +13206,26 @@
           <a:p>
             <a:r>
               <a:rPr lang="de-AT" dirty="0"/>
-              <a:t>Szenarien bei </a:t>
-            </a:r>
-            <a:r>
-              <a:rPr lang="de-AT" dirty="0" err="1"/>
-              <a:t>Buy</a:t>
-            </a:r>
-            <a:r>
+              <a:t>BUY-entscheidung</a:t>
+            </a:r>
+            <a:br>
               <a:rPr lang="de-AT" dirty="0"/>
-              <a:t>(</a:t>
-            </a:r>
-            <a:r>
-              <a:rPr lang="de-AT" dirty="0" err="1"/>
-              <a:t>use</a:t>
-            </a:r>
-            <a:r>
+            </a:br>
+            <a:br>
               <a:rPr lang="de-AT" dirty="0"/>
-              <a:t>)-entscheidung</a:t>
-            </a:r>
+            </a:br>
+            <a:r>
+              <a:rPr lang="de-AT" sz="1800" dirty="0"/>
+              <a:t>Implementieren einer neuen CRM-Lösung</a:t>
+            </a:r>
+            <a:endParaRPr lang="de-AT" dirty="0"/>
           </a:p>
         </p:txBody>
       </p:sp>
     </p:spTree>
     <p:extLst>
       <p:ext uri="{BB962C8B-B14F-4D97-AF65-F5344CB8AC3E}">
-        <p14:creationId xmlns:p14="http://schemas.microsoft.com/office/powerpoint/2010/main" val="2234918400"/>
+        <p14:creationId xmlns:p14="http://schemas.microsoft.com/office/powerpoint/2010/main" val="1272504719"/>
       </p:ext>
     </p:extLst>
   </p:cSld>
@@ -10790,8 +13270,8 @@
         </p:nvSpPr>
         <p:spPr>
           <a:xfrm>
-            <a:off x="549516" y="1337534"/>
-            <a:ext cx="7938000" cy="4502762"/>
+            <a:off x="549322" y="1380226"/>
+            <a:ext cx="7938000" cy="4757853"/>
           </a:xfrm>
         </p:spPr>
         <p:txBody>
@@ -10801,24 +13281,17 @@
             <a:endParaRPr lang="de-AT" dirty="0"/>
           </a:p>
           <a:p>
+            <a:pPr marL="285750" indent="-285750">
+              <a:buFont typeface="Arial" panose="020B0604020202020204" pitchFamily="34" charset="0"/>
+              <a:buChar char="•"/>
+            </a:pPr>
             <a:endParaRPr lang="de-AT" dirty="0"/>
           </a:p>
           <a:p>
-            <a:endParaRPr lang="de-AT" dirty="0"/>
-          </a:p>
-          <a:p>
-            <a:r>
-              <a:rPr lang="de-AT" dirty="0" err="1"/>
-              <a:t>Odoo</a:t>
-            </a:r>
-            <a:r>
-              <a:rPr lang="de-AT" dirty="0"/>
-              <a:t> CRM vs. Derzeitiges </a:t>
-            </a:r>
-            <a:r>
-              <a:rPr lang="de-AT" dirty="0" err="1"/>
-              <a:t>SuiteCRM</a:t>
-            </a:r>
+            <a:pPr marL="285750" indent="-285750">
+              <a:buFont typeface="Arial" panose="020B0604020202020204" pitchFamily="34" charset="0"/>
+              <a:buChar char="•"/>
+            </a:pPr>
             <a:endParaRPr lang="de-AT" dirty="0"/>
           </a:p>
         </p:txBody>
@@ -10902,14 +13375,280 @@
             <p:ph type="title"/>
           </p:nvPr>
         </p:nvSpPr>
-        <p:spPr/>
+        <p:spPr>
+          <a:xfrm>
+            <a:off x="549322" y="651700"/>
+            <a:ext cx="8594678" cy="938696"/>
+          </a:xfrm>
+        </p:spPr>
         <p:txBody>
           <a:bodyPr/>
           <a:lstStyle/>
           <a:p>
             <a:r>
               <a:rPr lang="de-AT" dirty="0"/>
-              <a:t>Fazit</a:t>
+              <a:t>BUY-entscheidung</a:t>
+            </a:r>
+            <a:br>
+              <a:rPr lang="de-AT" dirty="0"/>
+            </a:br>
+            <a:br>
+              <a:rPr lang="de-AT" dirty="0"/>
+            </a:br>
+            <a:r>
+              <a:rPr lang="de-AT" sz="1800" dirty="0"/>
+              <a:t>Implementieren einer neuen CRM-Lösung</a:t>
+            </a:r>
+            <a:endParaRPr lang="de-AT" dirty="0"/>
+          </a:p>
+        </p:txBody>
+      </p:sp>
+      <p:sp>
+        <p:nvSpPr>
+          <p:cNvPr id="7" name="Textplatzhalter 1">
+            <a:extLst>
+              <a:ext uri="{FF2B5EF4-FFF2-40B4-BE49-F238E27FC236}">
+                <a16:creationId xmlns:a16="http://schemas.microsoft.com/office/drawing/2014/main" id="{CA18D2F9-4AAD-4FD8-811E-08DF9CAFEC9A}"/>
+              </a:ext>
+            </a:extLst>
+          </p:cNvPr>
+          <p:cNvSpPr txBox="1">
+            <a:spLocks/>
+          </p:cNvSpPr>
+          <p:nvPr/>
+        </p:nvSpPr>
+        <p:spPr>
+          <a:xfrm>
+            <a:off x="701722" y="1532626"/>
+            <a:ext cx="7938000" cy="4757853"/>
+          </a:xfrm>
+          <a:prstGeom prst="rect">
+            <a:avLst/>
+          </a:prstGeom>
+        </p:spPr>
+        <p:txBody>
+          <a:bodyPr vert="horz" lIns="91440" tIns="45720" rIns="91440" bIns="45720" rtlCol="0">
+            <a:noAutofit/>
+          </a:bodyPr>
+          <a:lstStyle>
+            <a:lvl1pPr marL="0" indent="0" algn="l" defTabSz="914400" rtl="0" eaLnBrk="1" latinLnBrk="0" hangingPunct="1">
+              <a:lnSpc>
+                <a:spcPct val="105000"/>
+              </a:lnSpc>
+              <a:spcBef>
+                <a:spcPts val="1000"/>
+              </a:spcBef>
+              <a:spcAft>
+                <a:spcPts val="600"/>
+              </a:spcAft>
+              <a:buSzPct val="90000"/>
+              <a:buFontTx/>
+              <a:buNone/>
+              <a:defRPr lang="de-AT" sz="1700" kern="1200" baseline="0" noProof="0" dirty="0" smtClean="0">
+                <a:solidFill>
+                  <a:schemeClr val="tx1"/>
+                </a:solidFill>
+                <a:latin typeface="+mj-lt"/>
+                <a:ea typeface="+mn-ea"/>
+                <a:cs typeface="+mn-cs"/>
+              </a:defRPr>
+            </a:lvl1pPr>
+            <a:lvl2pPr marL="266700" indent="-266700" algn="l" defTabSz="914400" rtl="0" eaLnBrk="1" latinLnBrk="0" hangingPunct="1">
+              <a:lnSpc>
+                <a:spcPct val="105000"/>
+              </a:lnSpc>
+              <a:spcBef>
+                <a:spcPts val="0"/>
+              </a:spcBef>
+              <a:spcAft>
+                <a:spcPts val="600"/>
+              </a:spcAft>
+              <a:buSzPct val="90000"/>
+              <a:buFont typeface="Wingdings 2" panose="05020102010507070707" pitchFamily="18" charset="2"/>
+              <a:buChar char=""/>
+              <a:defRPr sz="1500" kern="1200">
+                <a:solidFill>
+                  <a:schemeClr val="tx1"/>
+                </a:solidFill>
+                <a:latin typeface="+mn-lt"/>
+                <a:ea typeface="+mn-ea"/>
+                <a:cs typeface="+mn-cs"/>
+              </a:defRPr>
+            </a:lvl2pPr>
+            <a:lvl3pPr marL="936000" indent="-288000" algn="l" defTabSz="914400" rtl="0" eaLnBrk="1" latinLnBrk="0" hangingPunct="1">
+              <a:lnSpc>
+                <a:spcPct val="105000"/>
+              </a:lnSpc>
+              <a:spcBef>
+                <a:spcPts val="0"/>
+              </a:spcBef>
+              <a:spcAft>
+                <a:spcPts val="600"/>
+              </a:spcAft>
+              <a:buFont typeface="Wingdings 2" panose="05020102010507070707" pitchFamily="18" charset="2"/>
+              <a:buChar char=""/>
+              <a:defRPr sz="1600" kern="1200">
+                <a:solidFill>
+                  <a:schemeClr val="tx1"/>
+                </a:solidFill>
+                <a:latin typeface="+mn-lt"/>
+                <a:ea typeface="+mn-ea"/>
+                <a:cs typeface="+mn-cs"/>
+              </a:defRPr>
+            </a:lvl3pPr>
+            <a:lvl4pPr marL="1224000" indent="-288000" algn="l" defTabSz="914400" rtl="0" eaLnBrk="1" latinLnBrk="0" hangingPunct="1">
+              <a:lnSpc>
+                <a:spcPct val="105000"/>
+              </a:lnSpc>
+              <a:spcBef>
+                <a:spcPts val="0"/>
+              </a:spcBef>
+              <a:spcAft>
+                <a:spcPts val="600"/>
+              </a:spcAft>
+              <a:buFont typeface="Wingdings 2" panose="05020102010507070707" pitchFamily="18" charset="2"/>
+              <a:buChar char=""/>
+              <a:defRPr sz="1500" kern="1200">
+                <a:solidFill>
+                  <a:schemeClr val="tx1"/>
+                </a:solidFill>
+                <a:latin typeface="+mn-lt"/>
+                <a:ea typeface="+mn-ea"/>
+                <a:cs typeface="+mn-cs"/>
+              </a:defRPr>
+            </a:lvl4pPr>
+            <a:lvl5pPr marL="1512000" indent="-288000" algn="l" defTabSz="914400" rtl="0" eaLnBrk="1" latinLnBrk="0" hangingPunct="1">
+              <a:lnSpc>
+                <a:spcPct val="105000"/>
+              </a:lnSpc>
+              <a:spcBef>
+                <a:spcPts val="0"/>
+              </a:spcBef>
+              <a:spcAft>
+                <a:spcPts val="600"/>
+              </a:spcAft>
+              <a:buFont typeface="Wingdings 2" panose="05020102010507070707" pitchFamily="18" charset="2"/>
+              <a:buChar char=""/>
+              <a:defRPr sz="1400" kern="1200">
+                <a:solidFill>
+                  <a:schemeClr val="tx1"/>
+                </a:solidFill>
+                <a:latin typeface="+mn-lt"/>
+                <a:ea typeface="+mn-ea"/>
+                <a:cs typeface="+mn-cs"/>
+              </a:defRPr>
+            </a:lvl5pPr>
+            <a:lvl6pPr marL="2514600" indent="-228600" algn="l" defTabSz="914400" rtl="0" eaLnBrk="1" latinLnBrk="0" hangingPunct="1">
+              <a:lnSpc>
+                <a:spcPct val="90000"/>
+              </a:lnSpc>
+              <a:spcBef>
+                <a:spcPts val="500"/>
+              </a:spcBef>
+              <a:buFont typeface="Arial" panose="020B0604020202020204" pitchFamily="34" charset="0"/>
+              <a:buChar char="•"/>
+              <a:defRPr sz="1800" kern="1200">
+                <a:solidFill>
+                  <a:schemeClr val="tx1"/>
+                </a:solidFill>
+                <a:latin typeface="+mn-lt"/>
+                <a:ea typeface="+mn-ea"/>
+                <a:cs typeface="+mn-cs"/>
+              </a:defRPr>
+            </a:lvl6pPr>
+            <a:lvl7pPr marL="2971800" indent="-228600" algn="l" defTabSz="914400" rtl="0" eaLnBrk="1" latinLnBrk="0" hangingPunct="1">
+              <a:lnSpc>
+                <a:spcPct val="90000"/>
+              </a:lnSpc>
+              <a:spcBef>
+                <a:spcPts val="500"/>
+              </a:spcBef>
+              <a:buFont typeface="Arial" panose="020B0604020202020204" pitchFamily="34" charset="0"/>
+              <a:buChar char="•"/>
+              <a:defRPr sz="1800" kern="1200">
+                <a:solidFill>
+                  <a:schemeClr val="tx1"/>
+                </a:solidFill>
+                <a:latin typeface="+mn-lt"/>
+                <a:ea typeface="+mn-ea"/>
+                <a:cs typeface="+mn-cs"/>
+              </a:defRPr>
+            </a:lvl7pPr>
+            <a:lvl8pPr marL="3429000" indent="-228600" algn="l" defTabSz="914400" rtl="0" eaLnBrk="1" latinLnBrk="0" hangingPunct="1">
+              <a:lnSpc>
+                <a:spcPct val="90000"/>
+              </a:lnSpc>
+              <a:spcBef>
+                <a:spcPts val="500"/>
+              </a:spcBef>
+              <a:buFont typeface="Arial" panose="020B0604020202020204" pitchFamily="34" charset="0"/>
+              <a:buChar char="•"/>
+              <a:defRPr sz="1800" kern="1200">
+                <a:solidFill>
+                  <a:schemeClr val="tx1"/>
+                </a:solidFill>
+                <a:latin typeface="+mn-lt"/>
+                <a:ea typeface="+mn-ea"/>
+                <a:cs typeface="+mn-cs"/>
+              </a:defRPr>
+            </a:lvl8pPr>
+            <a:lvl9pPr marL="3886200" indent="-228600" algn="l" defTabSz="914400" rtl="0" eaLnBrk="1" latinLnBrk="0" hangingPunct="1">
+              <a:lnSpc>
+                <a:spcPct val="90000"/>
+              </a:lnSpc>
+              <a:spcBef>
+                <a:spcPts val="500"/>
+              </a:spcBef>
+              <a:buFont typeface="Arial" panose="020B0604020202020204" pitchFamily="34" charset="0"/>
+              <a:buChar char="•"/>
+              <a:defRPr sz="1800" kern="1200">
+                <a:solidFill>
+                  <a:schemeClr val="tx1"/>
+                </a:solidFill>
+                <a:latin typeface="+mn-lt"/>
+                <a:ea typeface="+mn-ea"/>
+                <a:cs typeface="+mn-cs"/>
+              </a:defRPr>
+            </a:lvl9pPr>
+          </a:lstStyle>
+          <a:p>
+            <a:pPr marL="285750" indent="-285750">
+              <a:buFont typeface="Arial" panose="020B0604020202020204" pitchFamily="34" charset="0"/>
+              <a:buChar char="•"/>
+            </a:pPr>
+            <a:endParaRPr lang="de-AT" dirty="0"/>
+          </a:p>
+          <a:p>
+            <a:pPr marL="285750" indent="-285750">
+              <a:buFont typeface="Arial" panose="020B0604020202020204" pitchFamily="34" charset="0"/>
+              <a:buChar char="•"/>
+            </a:pPr>
+            <a:endParaRPr lang="de-AT" dirty="0"/>
+          </a:p>
+          <a:p>
+            <a:pPr marL="285750" indent="-285750">
+              <a:buFont typeface="Arial" panose="020B0604020202020204" pitchFamily="34" charset="0"/>
+              <a:buChar char="•"/>
+            </a:pPr>
+            <a:r>
+              <a:rPr lang="de-AT" dirty="0"/>
+              <a:t>Gegenüberstellung </a:t>
+            </a:r>
+            <a:r>
+              <a:rPr lang="de-AT" dirty="0" err="1"/>
+              <a:t>CiviCRM</a:t>
+            </a:r>
+            <a:r>
+              <a:rPr lang="de-AT" dirty="0"/>
+              <a:t> und </a:t>
+            </a:r>
+            <a:r>
+              <a:rPr lang="de-AT" dirty="0" err="1"/>
+              <a:t>Odoo</a:t>
+            </a:r>
+            <a:r>
+              <a:rPr lang="de-AT" dirty="0"/>
+              <a:t> CRM</a:t>
             </a:r>
           </a:p>
         </p:txBody>
@@ -10917,7 +13656,7 @@
     </p:spTree>
     <p:extLst>
       <p:ext uri="{BB962C8B-B14F-4D97-AF65-F5344CB8AC3E}">
-        <p14:creationId xmlns:p14="http://schemas.microsoft.com/office/powerpoint/2010/main" val="2621058405"/>
+        <p14:creationId xmlns:p14="http://schemas.microsoft.com/office/powerpoint/2010/main" val="2204222886"/>
       </p:ext>
     </p:extLst>
   </p:cSld>

</xml_diff>